<commit_message>
deleted older project folders
</commit_message>
<xml_diff>
--- a/DockerIntro.pptx
+++ b/DockerIntro.pptx
@@ -4,15 +4,21 @@
   <p:sldMasterIdLst>
     <p:sldMasterId id="2147483660" r:id="rId1"/>
   </p:sldMasterIdLst>
+  <p:notesMasterIdLst>
+    <p:notesMasterId r:id="rId13"/>
+  </p:notesMasterIdLst>
   <p:sldIdLst>
     <p:sldId id="256" r:id="rId2"/>
     <p:sldId id="257" r:id="rId3"/>
-    <p:sldId id="258" r:id="rId4"/>
-    <p:sldId id="259" r:id="rId5"/>
-    <p:sldId id="260" r:id="rId6"/>
-    <p:sldId id="262" r:id="rId7"/>
-    <p:sldId id="263" r:id="rId8"/>
-    <p:sldId id="261" r:id="rId9"/>
+    <p:sldId id="264" r:id="rId4"/>
+    <p:sldId id="265" r:id="rId5"/>
+    <p:sldId id="266" r:id="rId6"/>
+    <p:sldId id="258" r:id="rId7"/>
+    <p:sldId id="259" r:id="rId8"/>
+    <p:sldId id="260" r:id="rId9"/>
+    <p:sldId id="262" r:id="rId10"/>
+    <p:sldId id="263" r:id="rId11"/>
+    <p:sldId id="261" r:id="rId12"/>
   </p:sldIdLst>
   <p:sldSz cx="9144000" cy="6858000" type="screen4x3"/>
   <p:notesSz cx="6858000" cy="9144000"/>
@@ -112,6 +118,665 @@
     </a:lvl9pPr>
   </p:defaultTextStyle>
 </p:presentation>
+</file>
+
+<file path=ppt/notesMasters/notesMaster1.xml><?xml version="1.0" encoding="utf-8"?>
+<p:notesMaster xmlns:a="http://schemas.openxmlformats.org/drawingml/2006/main" xmlns:r="http://schemas.openxmlformats.org/officeDocument/2006/relationships" xmlns:p="http://schemas.openxmlformats.org/presentationml/2006/main">
+  <p:cSld>
+    <p:bg>
+      <p:bgRef idx="1001">
+        <a:schemeClr val="bg1"/>
+      </p:bgRef>
+    </p:bg>
+    <p:spTree>
+      <p:nvGrpSpPr>
+        <p:cNvPr id="1" name=""/>
+        <p:cNvGrpSpPr/>
+        <p:nvPr/>
+      </p:nvGrpSpPr>
+      <p:grpSpPr>
+        <a:xfrm>
+          <a:off x="0" y="0"/>
+          <a:ext cx="0" cy="0"/>
+          <a:chOff x="0" y="0"/>
+          <a:chExt cx="0" cy="0"/>
+        </a:xfrm>
+      </p:grpSpPr>
+      <p:sp>
+        <p:nvSpPr>
+          <p:cNvPr id="2" name="Überschriftenplatzhalter 1"/>
+          <p:cNvSpPr>
+            <a:spLocks noGrp="1"/>
+          </p:cNvSpPr>
+          <p:nvPr>
+            <p:ph type="hdr" sz="quarter"/>
+          </p:nvPr>
+        </p:nvSpPr>
+        <p:spPr>
+          <a:xfrm>
+            <a:off x="0" y="0"/>
+            <a:ext cx="2971800" cy="457200"/>
+          </a:xfrm>
+          <a:prstGeom prst="rect">
+            <a:avLst/>
+          </a:prstGeom>
+        </p:spPr>
+        <p:txBody>
+          <a:bodyPr vert="horz" lIns="91440" tIns="45720" rIns="91440" bIns="45720" rtlCol="0"/>
+          <a:lstStyle>
+            <a:lvl1pPr algn="l">
+              <a:defRPr sz="1200"/>
+            </a:lvl1pPr>
+          </a:lstStyle>
+          <a:p>
+            <a:endParaRPr lang="de-DE"/>
+          </a:p>
+        </p:txBody>
+      </p:sp>
+      <p:sp>
+        <p:nvSpPr>
+          <p:cNvPr id="3" name="Datumsplatzhalter 2"/>
+          <p:cNvSpPr>
+            <a:spLocks noGrp="1"/>
+          </p:cNvSpPr>
+          <p:nvPr>
+            <p:ph type="dt" idx="1"/>
+          </p:nvPr>
+        </p:nvSpPr>
+        <p:spPr>
+          <a:xfrm>
+            <a:off x="3884613" y="0"/>
+            <a:ext cx="2971800" cy="457200"/>
+          </a:xfrm>
+          <a:prstGeom prst="rect">
+            <a:avLst/>
+          </a:prstGeom>
+        </p:spPr>
+        <p:txBody>
+          <a:bodyPr vert="horz" lIns="91440" tIns="45720" rIns="91440" bIns="45720" rtlCol="0"/>
+          <a:lstStyle>
+            <a:lvl1pPr algn="r">
+              <a:defRPr sz="1200"/>
+            </a:lvl1pPr>
+          </a:lstStyle>
+          <a:p>
+            <a:fld id="{9BFA1865-5F55-9A43-A933-9B10340362CC}" type="datetimeFigureOut">
+              <a:rPr lang="de-DE" smtClean="0"/>
+              <a:t>26.02.15</a:t>
+            </a:fld>
+            <a:endParaRPr lang="de-DE"/>
+          </a:p>
+        </p:txBody>
+      </p:sp>
+      <p:sp>
+        <p:nvSpPr>
+          <p:cNvPr id="4" name="Folienbildplatzhalter 3"/>
+          <p:cNvSpPr>
+            <a:spLocks noGrp="1" noRot="1" noChangeAspect="1"/>
+          </p:cNvSpPr>
+          <p:nvPr>
+            <p:ph type="sldImg" idx="2"/>
+          </p:nvPr>
+        </p:nvSpPr>
+        <p:spPr>
+          <a:xfrm>
+            <a:off x="1143000" y="685800"/>
+            <a:ext cx="4572000" cy="3429000"/>
+          </a:xfrm>
+          <a:prstGeom prst="rect">
+            <a:avLst/>
+          </a:prstGeom>
+          <a:noFill/>
+          <a:ln w="12700">
+            <a:solidFill>
+              <a:prstClr val="black"/>
+            </a:solidFill>
+          </a:ln>
+        </p:spPr>
+        <p:txBody>
+          <a:bodyPr vert="horz" lIns="91440" tIns="45720" rIns="91440" bIns="45720" rtlCol="0" anchor="ctr"/>
+          <a:lstStyle/>
+          <a:p>
+            <a:endParaRPr lang="de-DE"/>
+          </a:p>
+        </p:txBody>
+      </p:sp>
+      <p:sp>
+        <p:nvSpPr>
+          <p:cNvPr id="5" name="Notizenplatzhalter 4"/>
+          <p:cNvSpPr>
+            <a:spLocks noGrp="1"/>
+          </p:cNvSpPr>
+          <p:nvPr>
+            <p:ph type="body" sz="quarter" idx="3"/>
+          </p:nvPr>
+        </p:nvSpPr>
+        <p:spPr>
+          <a:xfrm>
+            <a:off x="685800" y="4343400"/>
+            <a:ext cx="5486400" cy="4114800"/>
+          </a:xfrm>
+          <a:prstGeom prst="rect">
+            <a:avLst/>
+          </a:prstGeom>
+        </p:spPr>
+        <p:txBody>
+          <a:bodyPr vert="horz" lIns="91440" tIns="45720" rIns="91440" bIns="45720" rtlCol="0"/>
+          <a:lstStyle/>
+          <a:p>
+            <a:pPr lvl="0"/>
+            <a:r>
+              <a:rPr lang="de-DE" smtClean="0"/>
+              <a:t>Mastertextformat bearbeiten</a:t>
+            </a:r>
+          </a:p>
+          <a:p>
+            <a:pPr lvl="1"/>
+            <a:r>
+              <a:rPr lang="de-DE" smtClean="0"/>
+              <a:t>Zweite Ebene</a:t>
+            </a:r>
+          </a:p>
+          <a:p>
+            <a:pPr lvl="2"/>
+            <a:r>
+              <a:rPr lang="de-DE" smtClean="0"/>
+              <a:t>Dritte Ebene</a:t>
+            </a:r>
+          </a:p>
+          <a:p>
+            <a:pPr lvl="3"/>
+            <a:r>
+              <a:rPr lang="de-DE" smtClean="0"/>
+              <a:t>Vierte Ebene</a:t>
+            </a:r>
+          </a:p>
+          <a:p>
+            <a:pPr lvl="4"/>
+            <a:r>
+              <a:rPr lang="de-DE" smtClean="0"/>
+              <a:t>Fünfte Ebene</a:t>
+            </a:r>
+            <a:endParaRPr lang="de-DE"/>
+          </a:p>
+        </p:txBody>
+      </p:sp>
+      <p:sp>
+        <p:nvSpPr>
+          <p:cNvPr id="6" name="Fußzeilenplatzhalter 5"/>
+          <p:cNvSpPr>
+            <a:spLocks noGrp="1"/>
+          </p:cNvSpPr>
+          <p:nvPr>
+            <p:ph type="ftr" sz="quarter" idx="4"/>
+          </p:nvPr>
+        </p:nvSpPr>
+        <p:spPr>
+          <a:xfrm>
+            <a:off x="0" y="8685213"/>
+            <a:ext cx="2971800" cy="457200"/>
+          </a:xfrm>
+          <a:prstGeom prst="rect">
+            <a:avLst/>
+          </a:prstGeom>
+        </p:spPr>
+        <p:txBody>
+          <a:bodyPr vert="horz" lIns="91440" tIns="45720" rIns="91440" bIns="45720" rtlCol="0" anchor="b"/>
+          <a:lstStyle>
+            <a:lvl1pPr algn="l">
+              <a:defRPr sz="1200"/>
+            </a:lvl1pPr>
+          </a:lstStyle>
+          <a:p>
+            <a:endParaRPr lang="de-DE"/>
+          </a:p>
+        </p:txBody>
+      </p:sp>
+      <p:sp>
+        <p:nvSpPr>
+          <p:cNvPr id="7" name="Foliennummernplatzhalter 6"/>
+          <p:cNvSpPr>
+            <a:spLocks noGrp="1"/>
+          </p:cNvSpPr>
+          <p:nvPr>
+            <p:ph type="sldNum" sz="quarter" idx="5"/>
+          </p:nvPr>
+        </p:nvSpPr>
+        <p:spPr>
+          <a:xfrm>
+            <a:off x="3884613" y="8685213"/>
+            <a:ext cx="2971800" cy="457200"/>
+          </a:xfrm>
+          <a:prstGeom prst="rect">
+            <a:avLst/>
+          </a:prstGeom>
+        </p:spPr>
+        <p:txBody>
+          <a:bodyPr vert="horz" lIns="91440" tIns="45720" rIns="91440" bIns="45720" rtlCol="0" anchor="b"/>
+          <a:lstStyle>
+            <a:lvl1pPr algn="r">
+              <a:defRPr sz="1200"/>
+            </a:lvl1pPr>
+          </a:lstStyle>
+          <a:p>
+            <a:fld id="{77065775-5C7A-7746-B74B-BD6ADE2A0143}" type="slidenum">
+              <a:rPr lang="de-DE" smtClean="0"/>
+              <a:t>‹Nr.›</a:t>
+            </a:fld>
+            <a:endParaRPr lang="de-DE"/>
+          </a:p>
+        </p:txBody>
+      </p:sp>
+    </p:spTree>
+    <p:extLst>
+      <p:ext uri="{BB962C8B-B14F-4D97-AF65-F5344CB8AC3E}">
+        <p14:creationId xmlns:p14="http://schemas.microsoft.com/office/powerpoint/2010/main" val="1129673375"/>
+      </p:ext>
+    </p:extLst>
+  </p:cSld>
+  <p:clrMap bg1="lt1" tx1="dk1" bg2="lt2" tx2="dk2" accent1="accent1" accent2="accent2" accent3="accent3" accent4="accent4" accent5="accent5" accent6="accent6" hlink="hlink" folHlink="folHlink"/>
+  <p:notesStyle>
+    <a:lvl1pPr marL="0" algn="l" defTabSz="457200" rtl="0" eaLnBrk="1" latinLnBrk="0" hangingPunct="1">
+      <a:defRPr sz="1200" kern="1200">
+        <a:solidFill>
+          <a:schemeClr val="tx1"/>
+        </a:solidFill>
+        <a:latin typeface="+mn-lt"/>
+        <a:ea typeface="+mn-ea"/>
+        <a:cs typeface="+mn-cs"/>
+      </a:defRPr>
+    </a:lvl1pPr>
+    <a:lvl2pPr marL="457200" algn="l" defTabSz="457200" rtl="0" eaLnBrk="1" latinLnBrk="0" hangingPunct="1">
+      <a:defRPr sz="1200" kern="1200">
+        <a:solidFill>
+          <a:schemeClr val="tx1"/>
+        </a:solidFill>
+        <a:latin typeface="+mn-lt"/>
+        <a:ea typeface="+mn-ea"/>
+        <a:cs typeface="+mn-cs"/>
+      </a:defRPr>
+    </a:lvl2pPr>
+    <a:lvl3pPr marL="914400" algn="l" defTabSz="457200" rtl="0" eaLnBrk="1" latinLnBrk="0" hangingPunct="1">
+      <a:defRPr sz="1200" kern="1200">
+        <a:solidFill>
+          <a:schemeClr val="tx1"/>
+        </a:solidFill>
+        <a:latin typeface="+mn-lt"/>
+        <a:ea typeface="+mn-ea"/>
+        <a:cs typeface="+mn-cs"/>
+      </a:defRPr>
+    </a:lvl3pPr>
+    <a:lvl4pPr marL="1371600" algn="l" defTabSz="457200" rtl="0" eaLnBrk="1" latinLnBrk="0" hangingPunct="1">
+      <a:defRPr sz="1200" kern="1200">
+        <a:solidFill>
+          <a:schemeClr val="tx1"/>
+        </a:solidFill>
+        <a:latin typeface="+mn-lt"/>
+        <a:ea typeface="+mn-ea"/>
+        <a:cs typeface="+mn-cs"/>
+      </a:defRPr>
+    </a:lvl4pPr>
+    <a:lvl5pPr marL="1828800" algn="l" defTabSz="457200" rtl="0" eaLnBrk="1" latinLnBrk="0" hangingPunct="1">
+      <a:defRPr sz="1200" kern="1200">
+        <a:solidFill>
+          <a:schemeClr val="tx1"/>
+        </a:solidFill>
+        <a:latin typeface="+mn-lt"/>
+        <a:ea typeface="+mn-ea"/>
+        <a:cs typeface="+mn-cs"/>
+      </a:defRPr>
+    </a:lvl5pPr>
+    <a:lvl6pPr marL="2286000" algn="l" defTabSz="457200" rtl="0" eaLnBrk="1" latinLnBrk="0" hangingPunct="1">
+      <a:defRPr sz="1200" kern="1200">
+        <a:solidFill>
+          <a:schemeClr val="tx1"/>
+        </a:solidFill>
+        <a:latin typeface="+mn-lt"/>
+        <a:ea typeface="+mn-ea"/>
+        <a:cs typeface="+mn-cs"/>
+      </a:defRPr>
+    </a:lvl6pPr>
+    <a:lvl7pPr marL="2743200" algn="l" defTabSz="457200" rtl="0" eaLnBrk="1" latinLnBrk="0" hangingPunct="1">
+      <a:defRPr sz="1200" kern="1200">
+        <a:solidFill>
+          <a:schemeClr val="tx1"/>
+        </a:solidFill>
+        <a:latin typeface="+mn-lt"/>
+        <a:ea typeface="+mn-ea"/>
+        <a:cs typeface="+mn-cs"/>
+      </a:defRPr>
+    </a:lvl7pPr>
+    <a:lvl8pPr marL="3200400" algn="l" defTabSz="457200" rtl="0" eaLnBrk="1" latinLnBrk="0" hangingPunct="1">
+      <a:defRPr sz="1200" kern="1200">
+        <a:solidFill>
+          <a:schemeClr val="tx1"/>
+        </a:solidFill>
+        <a:latin typeface="+mn-lt"/>
+        <a:ea typeface="+mn-ea"/>
+        <a:cs typeface="+mn-cs"/>
+      </a:defRPr>
+    </a:lvl8pPr>
+    <a:lvl9pPr marL="3657600" algn="l" defTabSz="457200" rtl="0" eaLnBrk="1" latinLnBrk="0" hangingPunct="1">
+      <a:defRPr sz="1200" kern="1200">
+        <a:solidFill>
+          <a:schemeClr val="tx1"/>
+        </a:solidFill>
+        <a:latin typeface="+mn-lt"/>
+        <a:ea typeface="+mn-ea"/>
+        <a:cs typeface="+mn-cs"/>
+      </a:defRPr>
+    </a:lvl9pPr>
+  </p:notesStyle>
+</p:notesMaster>
+</file>
+
+<file path=ppt/notesSlides/notesSlide1.xml><?xml version="1.0" encoding="utf-8"?>
+<p:notes xmlns:a="http://schemas.openxmlformats.org/drawingml/2006/main" xmlns:r="http://schemas.openxmlformats.org/officeDocument/2006/relationships" xmlns:p="http://schemas.openxmlformats.org/presentationml/2006/main">
+  <p:cSld>
+    <p:spTree>
+      <p:nvGrpSpPr>
+        <p:cNvPr id="1" name=""/>
+        <p:cNvGrpSpPr/>
+        <p:nvPr/>
+      </p:nvGrpSpPr>
+      <p:grpSpPr>
+        <a:xfrm>
+          <a:off x="0" y="0"/>
+          <a:ext cx="0" cy="0"/>
+          <a:chOff x="0" y="0"/>
+          <a:chExt cx="0" cy="0"/>
+        </a:xfrm>
+      </p:grpSpPr>
+      <p:sp>
+        <p:nvSpPr>
+          <p:cNvPr id="2" name="Folienbildplatzhalter 1"/>
+          <p:cNvSpPr>
+            <a:spLocks noGrp="1" noRot="1" noChangeAspect="1"/>
+          </p:cNvSpPr>
+          <p:nvPr>
+            <p:ph type="sldImg"/>
+          </p:nvPr>
+        </p:nvSpPr>
+        <p:spPr/>
+      </p:sp>
+      <p:sp>
+        <p:nvSpPr>
+          <p:cNvPr id="3" name="Notizenplatzhalter 2"/>
+          <p:cNvSpPr>
+            <a:spLocks noGrp="1"/>
+          </p:cNvSpPr>
+          <p:nvPr>
+            <p:ph type="body" idx="1"/>
+          </p:nvPr>
+        </p:nvSpPr>
+        <p:spPr/>
+        <p:txBody>
+          <a:bodyPr/>
+          <a:lstStyle/>
+          <a:p>
+            <a:r>
+              <a:rPr lang="de-DE" dirty="0" smtClean="0"/>
+              <a:t>Open </a:t>
+            </a:r>
+            <a:r>
+              <a:rPr lang="de-DE" dirty="0" err="1" smtClean="0"/>
+              <a:t>Platform</a:t>
+            </a:r>
+            <a:r>
+              <a:rPr lang="de-DE" dirty="0" smtClean="0"/>
+              <a:t> für Entwickler und </a:t>
+            </a:r>
+            <a:r>
+              <a:rPr lang="de-DE" dirty="0" err="1" smtClean="0"/>
+              <a:t>Systemadmistratoren</a:t>
+            </a:r>
+            <a:endParaRPr lang="de-DE" dirty="0" smtClean="0"/>
+          </a:p>
+          <a:p>
+            <a:endParaRPr lang="de-DE" dirty="0" smtClean="0"/>
+          </a:p>
+          <a:p>
+            <a:r>
+              <a:rPr lang="de-DE" dirty="0" smtClean="0"/>
+              <a:t>Besteht aus:</a:t>
+            </a:r>
+            <a:endParaRPr lang="de-DE" baseline="0" dirty="0" smtClean="0"/>
+          </a:p>
+          <a:p>
+            <a:r>
+              <a:rPr lang="de-DE" baseline="0" dirty="0" smtClean="0"/>
+              <a:t>Docker Engine (Docker </a:t>
+            </a:r>
+            <a:r>
+              <a:rPr lang="de-DE" baseline="0" dirty="0" err="1" smtClean="0"/>
+              <a:t>Daemon</a:t>
+            </a:r>
+            <a:r>
+              <a:rPr lang="de-DE" baseline="0" dirty="0" smtClean="0"/>
+              <a:t> + </a:t>
+            </a:r>
+            <a:r>
+              <a:rPr lang="de-DE" baseline="0" dirty="0" err="1" smtClean="0"/>
+              <a:t>Packaging</a:t>
+            </a:r>
+            <a:r>
+              <a:rPr lang="de-DE" baseline="0" dirty="0" smtClean="0"/>
+              <a:t> Tool)</a:t>
+            </a:r>
+          </a:p>
+          <a:p>
+            <a:r>
+              <a:rPr lang="de-DE" baseline="0" dirty="0" smtClean="0"/>
+              <a:t>Docker Hub (Repository)</a:t>
+            </a:r>
+            <a:endParaRPr lang="de-DE" dirty="0" smtClean="0"/>
+          </a:p>
+          <a:p>
+            <a:endParaRPr lang="de-DE" dirty="0" smtClean="0"/>
+          </a:p>
+          <a:p>
+            <a:r>
+              <a:rPr lang="de-DE" dirty="0" smtClean="0"/>
+              <a:t>Wird bereits von einigen Formen produktiv eingesetzt, z.B. eBay</a:t>
+            </a:r>
+          </a:p>
+          <a:p>
+            <a:endParaRPr lang="de-DE" dirty="0"/>
+          </a:p>
+        </p:txBody>
+      </p:sp>
+      <p:sp>
+        <p:nvSpPr>
+          <p:cNvPr id="4" name="Foliennummernplatzhalter 3"/>
+          <p:cNvSpPr>
+            <a:spLocks noGrp="1"/>
+          </p:cNvSpPr>
+          <p:nvPr>
+            <p:ph type="sldNum" sz="quarter" idx="10"/>
+          </p:nvPr>
+        </p:nvSpPr>
+        <p:spPr/>
+        <p:txBody>
+          <a:bodyPr/>
+          <a:lstStyle/>
+          <a:p>
+            <a:fld id="{77065775-5C7A-7746-B74B-BD6ADE2A0143}" type="slidenum">
+              <a:rPr lang="de-DE" smtClean="0"/>
+              <a:t>2</a:t>
+            </a:fld>
+            <a:endParaRPr lang="de-DE"/>
+          </a:p>
+        </p:txBody>
+      </p:sp>
+    </p:spTree>
+    <p:extLst>
+      <p:ext uri="{BB962C8B-B14F-4D97-AF65-F5344CB8AC3E}">
+        <p14:creationId xmlns:p14="http://schemas.microsoft.com/office/powerpoint/2010/main" val="3594272592"/>
+      </p:ext>
+    </p:extLst>
+  </p:cSld>
+  <p:clrMapOvr>
+    <a:masterClrMapping/>
+  </p:clrMapOvr>
+</p:notes>
+</file>
+
+<file path=ppt/notesSlides/notesSlide2.xml><?xml version="1.0" encoding="utf-8"?>
+<p:notes xmlns:a="http://schemas.openxmlformats.org/drawingml/2006/main" xmlns:r="http://schemas.openxmlformats.org/officeDocument/2006/relationships" xmlns:p="http://schemas.openxmlformats.org/presentationml/2006/main">
+  <p:cSld>
+    <p:spTree>
+      <p:nvGrpSpPr>
+        <p:cNvPr id="1" name=""/>
+        <p:cNvGrpSpPr/>
+        <p:nvPr/>
+      </p:nvGrpSpPr>
+      <p:grpSpPr>
+        <a:xfrm>
+          <a:off x="0" y="0"/>
+          <a:ext cx="0" cy="0"/>
+          <a:chOff x="0" y="0"/>
+          <a:chExt cx="0" cy="0"/>
+        </a:xfrm>
+      </p:grpSpPr>
+      <p:sp>
+        <p:nvSpPr>
+          <p:cNvPr id="2" name="Folienbildplatzhalter 1"/>
+          <p:cNvSpPr>
+            <a:spLocks noGrp="1" noRot="1" noChangeAspect="1"/>
+          </p:cNvSpPr>
+          <p:nvPr>
+            <p:ph type="sldImg"/>
+          </p:nvPr>
+        </p:nvSpPr>
+        <p:spPr/>
+      </p:sp>
+      <p:sp>
+        <p:nvSpPr>
+          <p:cNvPr id="3" name="Notizenplatzhalter 2"/>
+          <p:cNvSpPr>
+            <a:spLocks noGrp="1"/>
+          </p:cNvSpPr>
+          <p:nvPr>
+            <p:ph type="body" idx="1"/>
+          </p:nvPr>
+        </p:nvSpPr>
+        <p:spPr/>
+        <p:txBody>
+          <a:bodyPr/>
+          <a:lstStyle/>
+          <a:p>
+            <a:r>
+              <a:rPr lang="de-DE" dirty="0" smtClean="0"/>
+              <a:t>Nichts Neues, aber...</a:t>
+            </a:r>
+          </a:p>
+          <a:p>
+            <a:endParaRPr lang="de-DE" dirty="0" smtClean="0"/>
+          </a:p>
+          <a:p>
+            <a:pPr marL="171450" indent="-171450">
+              <a:buFont typeface="Arial"/>
+              <a:buChar char="•"/>
+            </a:pPr>
+            <a:r>
+              <a:rPr lang="de-DE" dirty="0" err="1" smtClean="0"/>
+              <a:t>Virtualisierungs</a:t>
+            </a:r>
+            <a:r>
+              <a:rPr lang="de-DE" baseline="0" dirty="0" err="1" smtClean="0"/>
+              <a:t>technik</a:t>
+            </a:r>
+            <a:r>
+              <a:rPr lang="de-DE" baseline="0" dirty="0" smtClean="0"/>
+              <a:t> kombiniert </a:t>
+            </a:r>
+            <a:r>
+              <a:rPr lang="de-DE" dirty="0" smtClean="0"/>
+              <a:t>aus Laufzeitumgebung und Repository (Docker Hub ähnlich </a:t>
+            </a:r>
+            <a:r>
+              <a:rPr lang="de-DE" dirty="0" err="1" smtClean="0"/>
+              <a:t>GitHub</a:t>
+            </a:r>
+            <a:r>
+              <a:rPr lang="de-DE" dirty="0" smtClean="0"/>
+              <a:t>)</a:t>
+            </a:r>
+          </a:p>
+          <a:p>
+            <a:pPr marL="171450" indent="-171450">
+              <a:buFont typeface="Arial"/>
+              <a:buChar char="•"/>
+            </a:pPr>
+            <a:r>
+              <a:rPr lang="de-DE" dirty="0" smtClean="0"/>
+              <a:t>Bereits fertige Container erhältlich</a:t>
+            </a:r>
+          </a:p>
+          <a:p>
+            <a:pPr marL="171450" indent="-171450">
+              <a:buFontTx/>
+              <a:buChar char="•"/>
+            </a:pPr>
+            <a:r>
+              <a:rPr lang="de-DE" dirty="0" smtClean="0"/>
+              <a:t>Basiert</a:t>
+            </a:r>
+            <a:r>
+              <a:rPr lang="de-DE" baseline="0" dirty="0" smtClean="0"/>
+              <a:t> auf Linux-Container-Projekt (LXC) -&gt; nutzt spezielle Kernel-Funktionalitäten zur Isolierung von Prozessen</a:t>
+            </a:r>
+          </a:p>
+          <a:p>
+            <a:pPr marL="171450" indent="-171450">
+              <a:buFontTx/>
+              <a:buChar char="•"/>
+            </a:pPr>
+            <a:r>
+              <a:rPr lang="de-DE" baseline="0" dirty="0" smtClean="0"/>
+              <a:t>Docker Container -&gt; stapelbares Dateisystem</a:t>
+            </a:r>
+            <a:endParaRPr lang="de-DE" dirty="0" smtClean="0"/>
+          </a:p>
+          <a:p>
+            <a:endParaRPr lang="de-DE" dirty="0"/>
+          </a:p>
+        </p:txBody>
+      </p:sp>
+      <p:sp>
+        <p:nvSpPr>
+          <p:cNvPr id="4" name="Foliennummernplatzhalter 3"/>
+          <p:cNvSpPr>
+            <a:spLocks noGrp="1"/>
+          </p:cNvSpPr>
+          <p:nvPr>
+            <p:ph type="sldNum" sz="quarter" idx="10"/>
+          </p:nvPr>
+        </p:nvSpPr>
+        <p:spPr/>
+        <p:txBody>
+          <a:bodyPr/>
+          <a:lstStyle/>
+          <a:p>
+            <a:fld id="{77065775-5C7A-7746-B74B-BD6ADE2A0143}" type="slidenum">
+              <a:rPr lang="de-DE" smtClean="0"/>
+              <a:t>3</a:t>
+            </a:fld>
+            <a:endParaRPr lang="de-DE"/>
+          </a:p>
+        </p:txBody>
+      </p:sp>
+    </p:spTree>
+    <p:extLst>
+      <p:ext uri="{BB962C8B-B14F-4D97-AF65-F5344CB8AC3E}">
+        <p14:creationId xmlns:p14="http://schemas.microsoft.com/office/powerpoint/2010/main" val="3427157255"/>
+      </p:ext>
+    </p:extLst>
+  </p:cSld>
+  <p:clrMapOvr>
+    <a:masterClrMapping/>
+  </p:clrMapOvr>
+</p:notes>
 </file>
 
 <file path=ppt/slideLayouts/slideLayout1.xml><?xml version="1.0" encoding="utf-8"?>
@@ -5025,6 +5690,462 @@
 </p:sld>
 </file>
 
+<file path=ppt/slides/slide10.xml><?xml version="1.0" encoding="utf-8"?>
+<p:sld xmlns:a="http://schemas.openxmlformats.org/drawingml/2006/main" xmlns:r="http://schemas.openxmlformats.org/officeDocument/2006/relationships" xmlns:p="http://schemas.openxmlformats.org/presentationml/2006/main">
+  <p:cSld>
+    <p:spTree>
+      <p:nvGrpSpPr>
+        <p:cNvPr id="1" name=""/>
+        <p:cNvGrpSpPr/>
+        <p:nvPr/>
+      </p:nvGrpSpPr>
+      <p:grpSpPr>
+        <a:xfrm>
+          <a:off x="0" y="0"/>
+          <a:ext cx="0" cy="0"/>
+          <a:chOff x="0" y="0"/>
+          <a:chExt cx="0" cy="0"/>
+        </a:xfrm>
+      </p:grpSpPr>
+      <p:sp>
+        <p:nvSpPr>
+          <p:cNvPr id="2" name="Titel 1"/>
+          <p:cNvSpPr>
+            <a:spLocks noGrp="1"/>
+          </p:cNvSpPr>
+          <p:nvPr>
+            <p:ph type="title"/>
+          </p:nvPr>
+        </p:nvSpPr>
+        <p:spPr/>
+        <p:txBody>
+          <a:bodyPr/>
+          <a:lstStyle/>
+          <a:p>
+            <a:endParaRPr lang="de-DE"/>
+          </a:p>
+        </p:txBody>
+      </p:sp>
+      <p:sp>
+        <p:nvSpPr>
+          <p:cNvPr id="5" name="Textfeld 4"/>
+          <p:cNvSpPr txBox="1"/>
+          <p:nvPr/>
+        </p:nvSpPr>
+        <p:spPr>
+          <a:xfrm>
+            <a:off x="156844" y="1676954"/>
+            <a:ext cx="8858280" cy="2308324"/>
+          </a:xfrm>
+          <a:prstGeom prst="rect">
+            <a:avLst/>
+          </a:prstGeom>
+          <a:noFill/>
+        </p:spPr>
+        <p:txBody>
+          <a:bodyPr wrap="square" rtlCol="0">
+            <a:spAutoFit/>
+          </a:bodyPr>
+          <a:lstStyle/>
+          <a:p>
+            <a:r>
+              <a:rPr lang="fi-FI" sz="1600" dirty="0" smtClean="0"/>
+              <a:t>…</a:t>
+            </a:r>
+          </a:p>
+          <a:p>
+            <a:r>
+              <a:rPr lang="fi-FI" sz="1600" dirty="0" smtClean="0"/>
+              <a:t>└</a:t>
+            </a:r>
+            <a:r>
+              <a:rPr lang="fi-FI" sz="1600" dirty="0"/>
+              <a:t>─c67aa605647c </a:t>
+            </a:r>
+            <a:r>
+              <a:rPr lang="fi-FI" sz="1600" dirty="0" err="1"/>
+              <a:t>Virtual</a:t>
+            </a:r>
+            <a:r>
+              <a:rPr lang="fi-FI" sz="1600" dirty="0"/>
+              <a:t> </a:t>
+            </a:r>
+            <a:r>
+              <a:rPr lang="fi-FI" sz="1600" dirty="0" err="1"/>
+              <a:t>Size</a:t>
+            </a:r>
+            <a:r>
+              <a:rPr lang="fi-FI" sz="1600" dirty="0"/>
+              <a:t>: 575.8 MB</a:t>
+            </a:r>
+          </a:p>
+          <a:p>
+            <a:r>
+              <a:rPr lang="en-US" sz="1600" dirty="0"/>
+              <a:t> </a:t>
+            </a:r>
+            <a:r>
+              <a:rPr lang="en-US" sz="1600" dirty="0"/>
+              <a:t> </a:t>
+            </a:r>
+            <a:r>
+              <a:rPr lang="en-US" sz="1600" dirty="0" smtClean="0"/>
+              <a:t> └</a:t>
+            </a:r>
+            <a:r>
+              <a:rPr lang="en-US" sz="1600" dirty="0"/>
+              <a:t>─6336aee1007d Virtual Size: 643.3 MB Tags: ra1f/</a:t>
+            </a:r>
+            <a:r>
+              <a:rPr lang="en-US" sz="1600" dirty="0" err="1"/>
+              <a:t>docker_intro_groovy:latest</a:t>
+            </a:r>
+            <a:endParaRPr lang="en-US" sz="1600" dirty="0"/>
+          </a:p>
+          <a:p>
+            <a:r>
+              <a:rPr lang="en-US" sz="1600" dirty="0"/>
+              <a:t>       </a:t>
+            </a:r>
+            <a:r>
+              <a:rPr lang="en-US" sz="1600" dirty="0" smtClean="0"/>
+              <a:t>└─</a:t>
+            </a:r>
+            <a:r>
+              <a:rPr lang="en-US" sz="1600" dirty="0"/>
+              <a:t>d33ff67873b2 Virtual Size: 643.3 MB</a:t>
+            </a:r>
+          </a:p>
+          <a:p>
+            <a:r>
+              <a:rPr lang="en-US" sz="1600" dirty="0"/>
+              <a:t>           </a:t>
+            </a:r>
+            <a:r>
+              <a:rPr lang="en-US" sz="1600" dirty="0" smtClean="0"/>
+              <a:t>└─</a:t>
+            </a:r>
+            <a:r>
+              <a:rPr lang="en-US" sz="1600" dirty="0"/>
+              <a:t>0470c866273e Virtual Size: 643.3 MB</a:t>
+            </a:r>
+          </a:p>
+          <a:p>
+            <a:r>
+              <a:rPr lang="en-US" sz="1600" dirty="0"/>
+              <a:t>               </a:t>
+            </a:r>
+            <a:r>
+              <a:rPr lang="en-US" sz="1600" dirty="0" smtClean="0"/>
+              <a:t>└─</a:t>
+            </a:r>
+            <a:r>
+              <a:rPr lang="en-US" sz="1600" dirty="0"/>
+              <a:t>75ba993b078c Virtual Size: 643.3 MB</a:t>
+            </a:r>
+          </a:p>
+          <a:p>
+            <a:r>
+              <a:rPr lang="en-US" sz="1600" dirty="0"/>
+              <a:t>                  </a:t>
+            </a:r>
+            <a:r>
+              <a:rPr lang="en-US" sz="1600" dirty="0"/>
+              <a:t> </a:t>
+            </a:r>
+            <a:r>
+              <a:rPr lang="en-US" sz="1600" dirty="0" smtClean="0"/>
+              <a:t>└</a:t>
+            </a:r>
+            <a:r>
+              <a:rPr lang="en-US" sz="1600" dirty="0"/>
+              <a:t>─97fcbbab0d06 Virtual Size: 643.3 MB</a:t>
+            </a:r>
+          </a:p>
+          <a:p>
+            <a:r>
+              <a:rPr lang="en-US" sz="1600" dirty="0"/>
+              <a:t>                   </a:t>
+            </a:r>
+            <a:r>
+              <a:rPr lang="en-US" sz="1600" dirty="0"/>
+              <a:t> </a:t>
+            </a:r>
+            <a:r>
+              <a:rPr lang="en-US" sz="1600" dirty="0" smtClean="0"/>
+              <a:t>   └</a:t>
+            </a:r>
+            <a:r>
+              <a:rPr lang="en-US" sz="1600" dirty="0"/>
+              <a:t>─93ef859422de Virtual Size: 643.3 MB</a:t>
+            </a:r>
+          </a:p>
+          <a:p>
+            <a:r>
+              <a:rPr lang="sv-SE" sz="1600" dirty="0"/>
+              <a:t>                          </a:t>
+            </a:r>
+            <a:r>
+              <a:rPr lang="sv-SE" sz="1600" dirty="0"/>
+              <a:t> </a:t>
+            </a:r>
+            <a:r>
+              <a:rPr lang="sv-SE" sz="1600" dirty="0" smtClean="0"/>
+              <a:t> └</a:t>
+            </a:r>
+            <a:r>
+              <a:rPr lang="sv-SE" sz="1600" dirty="0"/>
+              <a:t>─f466026ee004 </a:t>
+            </a:r>
+            <a:r>
+              <a:rPr lang="sv-SE" sz="1600" dirty="0" err="1"/>
+              <a:t>Virtual</a:t>
+            </a:r>
+            <a:r>
+              <a:rPr lang="sv-SE" sz="1600" dirty="0"/>
+              <a:t> </a:t>
+            </a:r>
+            <a:r>
+              <a:rPr lang="sv-SE" sz="1600" dirty="0" err="1"/>
+              <a:t>Size</a:t>
+            </a:r>
+            <a:r>
+              <a:rPr lang="sv-SE" sz="1600" dirty="0"/>
+              <a:t>: 643.3 MB Tags: ra1f/</a:t>
+            </a:r>
+            <a:r>
+              <a:rPr lang="sv-SE" sz="1600" dirty="0" err="1"/>
+              <a:t>docker_intro_webserver:latest</a:t>
+            </a:r>
+            <a:endParaRPr lang="de-DE" sz="1600" dirty="0"/>
+          </a:p>
+        </p:txBody>
+      </p:sp>
+    </p:spTree>
+    <p:extLst>
+      <p:ext uri="{BB962C8B-B14F-4D97-AF65-F5344CB8AC3E}">
+        <p14:creationId xmlns:p14="http://schemas.microsoft.com/office/powerpoint/2010/main" val="720670703"/>
+      </p:ext>
+    </p:extLst>
+  </p:cSld>
+  <p:clrMapOvr>
+    <a:masterClrMapping/>
+  </p:clrMapOvr>
+</p:sld>
+</file>
+
+<file path=ppt/slides/slide11.xml><?xml version="1.0" encoding="utf-8"?>
+<p:sld xmlns:a="http://schemas.openxmlformats.org/drawingml/2006/main" xmlns:r="http://schemas.openxmlformats.org/officeDocument/2006/relationships" xmlns:p="http://schemas.openxmlformats.org/presentationml/2006/main">
+  <p:cSld>
+    <p:spTree>
+      <p:nvGrpSpPr>
+        <p:cNvPr id="1" name=""/>
+        <p:cNvGrpSpPr/>
+        <p:nvPr/>
+      </p:nvGrpSpPr>
+      <p:grpSpPr>
+        <a:xfrm>
+          <a:off x="0" y="0"/>
+          <a:ext cx="0" cy="0"/>
+          <a:chOff x="0" y="0"/>
+          <a:chExt cx="0" cy="0"/>
+        </a:xfrm>
+      </p:grpSpPr>
+      <p:sp>
+        <p:nvSpPr>
+          <p:cNvPr id="2" name="Titel 1"/>
+          <p:cNvSpPr>
+            <a:spLocks noGrp="1"/>
+          </p:cNvSpPr>
+          <p:nvPr>
+            <p:ph type="title"/>
+          </p:nvPr>
+        </p:nvSpPr>
+        <p:spPr/>
+        <p:txBody>
+          <a:bodyPr/>
+          <a:lstStyle/>
+          <a:p>
+            <a:r>
+              <a:rPr lang="de-DE" dirty="0" smtClean="0"/>
+              <a:t>Run</a:t>
+            </a:r>
+            <a:endParaRPr lang="de-DE" dirty="0"/>
+          </a:p>
+        </p:txBody>
+      </p:sp>
+      <p:sp>
+        <p:nvSpPr>
+          <p:cNvPr id="5" name="Textfeld 4"/>
+          <p:cNvSpPr txBox="1"/>
+          <p:nvPr/>
+        </p:nvSpPr>
+        <p:spPr>
+          <a:xfrm>
+            <a:off x="821068" y="3027333"/>
+            <a:ext cx="7934684" cy="923330"/>
+          </a:xfrm>
+          <a:prstGeom prst="rect">
+            <a:avLst/>
+          </a:prstGeom>
+          <a:noFill/>
+        </p:spPr>
+        <p:txBody>
+          <a:bodyPr wrap="none" rtlCol="0">
+            <a:spAutoFit/>
+          </a:bodyPr>
+          <a:lstStyle/>
+          <a:p>
+            <a:r>
+              <a:rPr lang="de-DE" dirty="0" err="1"/>
+              <a:t>docker</a:t>
+            </a:r>
+            <a:r>
+              <a:rPr lang="de-DE" dirty="0"/>
+              <a:t> </a:t>
+            </a:r>
+            <a:r>
+              <a:rPr lang="de-DE" dirty="0" err="1"/>
+              <a:t>run</a:t>
+            </a:r>
+            <a:r>
+              <a:rPr lang="de-DE" dirty="0"/>
+              <a:t> -d --</a:t>
+            </a:r>
+            <a:r>
+              <a:rPr lang="de-DE" dirty="0" err="1"/>
+              <a:t>cidfile</a:t>
+            </a:r>
+            <a:r>
+              <a:rPr lang="de-DE" dirty="0"/>
+              <a:t>=$&lt;/webserver-$$</a:t>
+            </a:r>
+            <a:r>
+              <a:rPr lang="de-DE" dirty="0" err="1"/>
+              <a:t>i.cid</a:t>
+            </a:r>
+            <a:r>
+              <a:rPr lang="de-DE" dirty="0"/>
+              <a:t> --name=$$</a:t>
+            </a:r>
+            <a:r>
+              <a:rPr lang="de-DE" dirty="0" err="1"/>
+              <a:t>name</a:t>
+            </a:r>
+            <a:r>
+              <a:rPr lang="de-DE" dirty="0"/>
+              <a:t> </a:t>
+            </a:r>
+            <a:endParaRPr lang="de-DE" dirty="0" smtClean="0"/>
+          </a:p>
+          <a:p>
+            <a:r>
+              <a:rPr lang="de-DE" dirty="0"/>
+              <a:t> </a:t>
+            </a:r>
+            <a:r>
+              <a:rPr lang="de-DE" dirty="0" smtClean="0"/>
+              <a:t>                      -</a:t>
+            </a:r>
+            <a:r>
+              <a:rPr lang="de-DE" dirty="0"/>
+              <a:t>-hostname=$$</a:t>
+            </a:r>
+            <a:r>
+              <a:rPr lang="de-DE" dirty="0" err="1"/>
+              <a:t>name</a:t>
+            </a:r>
+            <a:r>
+              <a:rPr lang="de-DE" dirty="0"/>
+              <a:t> -v `</a:t>
+            </a:r>
+            <a:r>
+              <a:rPr lang="de-DE" dirty="0" err="1"/>
+              <a:t>pwd</a:t>
+            </a:r>
+            <a:r>
+              <a:rPr lang="de-DE" dirty="0"/>
+              <a:t>`/$&lt;:/</a:t>
+            </a:r>
+            <a:r>
+              <a:rPr lang="de-DE" dirty="0" err="1"/>
+              <a:t>logs</a:t>
+            </a:r>
+            <a:r>
+              <a:rPr lang="de-DE" dirty="0"/>
+              <a:t> </a:t>
+            </a:r>
+            <a:endParaRPr lang="de-DE" dirty="0" smtClean="0"/>
+          </a:p>
+          <a:p>
+            <a:r>
+              <a:rPr lang="de-DE" dirty="0"/>
+              <a:t> </a:t>
+            </a:r>
+            <a:r>
+              <a:rPr lang="de-DE" dirty="0" smtClean="0"/>
+              <a:t>                     </a:t>
+            </a:r>
+            <a:r>
+              <a:rPr lang="de-DE" dirty="0"/>
+              <a:t> ra1f/</a:t>
+            </a:r>
+            <a:r>
+              <a:rPr lang="de-DE"/>
+              <a:t>docker_intro_webserver:latest</a:t>
+            </a:r>
+            <a:r>
+              <a:rPr lang="de-DE" dirty="0"/>
+              <a:t> /</a:t>
+            </a:r>
+            <a:r>
+              <a:rPr lang="de-DE" dirty="0" err="1"/>
+              <a:t>opt</a:t>
+            </a:r>
+            <a:r>
+              <a:rPr lang="de-DE" dirty="0"/>
+              <a:t>/</a:t>
+            </a:r>
+            <a:r>
+              <a:rPr lang="de-DE" dirty="0" err="1"/>
+              <a:t>webserver</a:t>
+            </a:r>
+            <a:r>
+              <a:rPr lang="de-DE" dirty="0"/>
+              <a:t>/</a:t>
+            </a:r>
+            <a:r>
+              <a:rPr lang="de-DE" dirty="0" err="1"/>
+              <a:t>run.sh</a:t>
+            </a:r>
+            <a:r>
+              <a:rPr lang="de-DE" dirty="0"/>
+              <a:t> /</a:t>
+            </a:r>
+            <a:r>
+              <a:rPr lang="de-DE" dirty="0" err="1"/>
+              <a:t>logs</a:t>
+            </a:r>
+            <a:r>
+              <a:rPr lang="de-DE" dirty="0"/>
+              <a:t>)</a:t>
+            </a:r>
+          </a:p>
+        </p:txBody>
+      </p:sp>
+    </p:spTree>
+    <p:extLst>
+      <p:ext uri="{BB962C8B-B14F-4D97-AF65-F5344CB8AC3E}">
+        <p14:creationId xmlns:p14="http://schemas.microsoft.com/office/powerpoint/2010/main" val="4237599935"/>
+      </p:ext>
+    </p:extLst>
+  </p:cSld>
+  <p:clrMapOvr>
+    <a:masterClrMapping/>
+  </p:clrMapOvr>
+</p:sld>
+</file>
+
 <file path=ppt/slides/slide2.xml><?xml version="1.0" encoding="utf-8"?>
 <p:sld xmlns:a="http://schemas.openxmlformats.org/drawingml/2006/main" xmlns:r="http://schemas.openxmlformats.org/officeDocument/2006/relationships" xmlns:p="http://schemas.openxmlformats.org/presentationml/2006/main">
   <p:cSld>
@@ -5080,10 +6201,283 @@
           <a:bodyPr/>
           <a:lstStyle/>
           <a:p>
+            <a:pPr marL="0" indent="0">
+              <a:buNone/>
+            </a:pPr>
+            <a:endParaRPr lang="de-DE" dirty="0" smtClean="0"/>
+          </a:p>
+          <a:p>
+            <a:pPr marL="0" indent="0">
+              <a:buNone/>
+            </a:pPr>
+            <a:r>
+              <a:rPr lang="de-DE" dirty="0" smtClean="0">
+                <a:hlinkClick r:id="rId3"/>
+              </a:rPr>
+              <a:t>www.docker.com</a:t>
+            </a:r>
+            <a:r>
+              <a:rPr lang="de-DE" dirty="0" smtClean="0"/>
+              <a:t>:</a:t>
+            </a:r>
+          </a:p>
+          <a:p>
+            <a:pPr marL="0" indent="0">
+              <a:buNone/>
+            </a:pPr>
+            <a:r>
+              <a:rPr lang="de-DE" dirty="0" smtClean="0"/>
+              <a:t>„...</a:t>
+            </a:r>
+            <a:r>
+              <a:rPr lang="de-DE" dirty="0"/>
+              <a:t> </a:t>
+            </a:r>
+            <a:r>
+              <a:rPr lang="de-DE" dirty="0" err="1"/>
+              <a:t>eliminates</a:t>
+            </a:r>
+            <a:r>
+              <a:rPr lang="de-DE" dirty="0"/>
+              <a:t> </a:t>
+            </a:r>
+            <a:r>
+              <a:rPr lang="de-DE" dirty="0" err="1"/>
+              <a:t>the</a:t>
+            </a:r>
+            <a:r>
+              <a:rPr lang="de-DE" dirty="0"/>
+              <a:t> </a:t>
+            </a:r>
+            <a:r>
+              <a:rPr lang="de-DE" dirty="0" err="1"/>
+              <a:t>friction</a:t>
+            </a:r>
+            <a:r>
+              <a:rPr lang="de-DE" dirty="0"/>
+              <a:t> </a:t>
+            </a:r>
+            <a:r>
+              <a:rPr lang="de-DE" dirty="0" err="1"/>
+              <a:t>between</a:t>
+            </a:r>
+            <a:r>
+              <a:rPr lang="de-DE" dirty="0"/>
+              <a:t> </a:t>
+            </a:r>
+            <a:r>
+              <a:rPr lang="de-DE" dirty="0" err="1"/>
+              <a:t>development</a:t>
+            </a:r>
+            <a:r>
+              <a:rPr lang="de-DE" dirty="0"/>
+              <a:t>, QA, </a:t>
+            </a:r>
+            <a:r>
+              <a:rPr lang="de-DE" dirty="0" err="1"/>
+              <a:t>and</a:t>
+            </a:r>
+            <a:r>
+              <a:rPr lang="de-DE" dirty="0"/>
+              <a:t> </a:t>
+            </a:r>
+            <a:r>
+              <a:rPr lang="de-DE" dirty="0" err="1"/>
+              <a:t>production</a:t>
+            </a:r>
+            <a:r>
+              <a:rPr lang="de-DE" dirty="0"/>
+              <a:t> </a:t>
+            </a:r>
+            <a:r>
+              <a:rPr lang="de-DE" dirty="0" err="1" smtClean="0"/>
+              <a:t>environments</a:t>
+            </a:r>
+            <a:r>
+              <a:rPr lang="de-DE" dirty="0" smtClean="0"/>
+              <a:t>...“</a:t>
+            </a:r>
+          </a:p>
+          <a:p>
+            <a:pPr marL="0" indent="0">
+              <a:buNone/>
+            </a:pPr>
+            <a:r>
+              <a:rPr lang="de-DE" dirty="0" smtClean="0"/>
+              <a:t>„...</a:t>
+            </a:r>
+            <a:r>
+              <a:rPr lang="de-DE" dirty="0"/>
+              <a:t> </a:t>
+            </a:r>
+            <a:r>
+              <a:rPr lang="de-DE" dirty="0" smtClean="0"/>
+              <a:t>IT </a:t>
+            </a:r>
+            <a:r>
+              <a:rPr lang="de-DE" dirty="0" err="1"/>
+              <a:t>can</a:t>
+            </a:r>
+            <a:r>
+              <a:rPr lang="de-DE" dirty="0"/>
+              <a:t> </a:t>
+            </a:r>
+            <a:r>
+              <a:rPr lang="de-DE" dirty="0" err="1"/>
+              <a:t>ship</a:t>
+            </a:r>
+            <a:r>
+              <a:rPr lang="de-DE" dirty="0"/>
+              <a:t> </a:t>
+            </a:r>
+            <a:r>
+              <a:rPr lang="de-DE" dirty="0" err="1"/>
+              <a:t>faster</a:t>
+            </a:r>
+            <a:r>
+              <a:rPr lang="de-DE" dirty="0"/>
+              <a:t> </a:t>
+            </a:r>
+            <a:r>
+              <a:rPr lang="de-DE" dirty="0" err="1"/>
+              <a:t>and</a:t>
+            </a:r>
+            <a:r>
+              <a:rPr lang="de-DE" dirty="0"/>
+              <a:t> </a:t>
+            </a:r>
+            <a:r>
+              <a:rPr lang="de-DE" dirty="0" err="1"/>
+              <a:t>run</a:t>
+            </a:r>
+            <a:r>
+              <a:rPr lang="de-DE" dirty="0"/>
+              <a:t> </a:t>
+            </a:r>
+            <a:r>
+              <a:rPr lang="de-DE" dirty="0" err="1"/>
+              <a:t>the</a:t>
+            </a:r>
+            <a:r>
+              <a:rPr lang="de-DE" dirty="0"/>
+              <a:t> same </a:t>
+            </a:r>
+            <a:r>
+              <a:rPr lang="de-DE" dirty="0" err="1"/>
+              <a:t>app</a:t>
+            </a:r>
+            <a:r>
+              <a:rPr lang="de-DE" dirty="0"/>
+              <a:t>, </a:t>
+            </a:r>
+            <a:r>
+              <a:rPr lang="de-DE" dirty="0" err="1"/>
+              <a:t>unchanged</a:t>
+            </a:r>
+            <a:r>
+              <a:rPr lang="de-DE" dirty="0"/>
+              <a:t>, on </a:t>
+            </a:r>
+            <a:r>
+              <a:rPr lang="de-DE" dirty="0" err="1"/>
+              <a:t>laptops</a:t>
+            </a:r>
+            <a:r>
+              <a:rPr lang="de-DE" dirty="0"/>
+              <a:t>, </a:t>
+            </a:r>
+            <a:r>
+              <a:rPr lang="de-DE" dirty="0" err="1"/>
+              <a:t>data</a:t>
+            </a:r>
+            <a:r>
+              <a:rPr lang="de-DE" dirty="0"/>
+              <a:t> </a:t>
+            </a:r>
+            <a:r>
+              <a:rPr lang="de-DE" dirty="0" err="1"/>
+              <a:t>center</a:t>
+            </a:r>
+            <a:r>
+              <a:rPr lang="de-DE" dirty="0"/>
+              <a:t> VMs, </a:t>
+            </a:r>
+            <a:r>
+              <a:rPr lang="de-DE" dirty="0" err="1"/>
+              <a:t>and</a:t>
+            </a:r>
+            <a:r>
+              <a:rPr lang="de-DE" dirty="0"/>
+              <a:t> </a:t>
+            </a:r>
+            <a:r>
+              <a:rPr lang="de-DE" dirty="0" err="1"/>
+              <a:t>any</a:t>
+            </a:r>
+            <a:r>
+              <a:rPr lang="de-DE" dirty="0"/>
+              <a:t> </a:t>
+            </a:r>
+            <a:r>
+              <a:rPr lang="de-DE" dirty="0" err="1" smtClean="0"/>
+              <a:t>cloud</a:t>
+            </a:r>
+            <a:r>
+              <a:rPr lang="de-DE" dirty="0" smtClean="0"/>
+              <a:t>“</a:t>
+            </a:r>
             <a:endParaRPr lang="de-DE" dirty="0"/>
           </a:p>
-        </p:txBody>
-      </p:sp>
+          <a:p>
+            <a:pPr marL="0" indent="0">
+              <a:buNone/>
+            </a:pPr>
+            <a:endParaRPr lang="de-DE" dirty="0" smtClean="0"/>
+          </a:p>
+          <a:p>
+            <a:pPr marL="0" indent="0">
+              <a:buNone/>
+            </a:pPr>
+            <a:endParaRPr lang="de-DE" dirty="0"/>
+          </a:p>
+          <a:p>
+            <a:pPr marL="0" indent="0">
+              <a:buNone/>
+            </a:pPr>
+            <a:endParaRPr lang="de-DE" dirty="0"/>
+          </a:p>
+        </p:txBody>
+      </p:sp>
+      <p:pic>
+        <p:nvPicPr>
+          <p:cNvPr id="4" name="Bild 3" descr="docker-logo-loggedout.png"/>
+          <p:cNvPicPr>
+            <a:picLocks noChangeAspect="1"/>
+          </p:cNvPicPr>
+          <p:nvPr/>
+        </p:nvPicPr>
+        <p:blipFill>
+          <a:blip r:embed="rId4">
+            <a:extLst>
+              <a:ext uri="{28A0092B-C50C-407E-A947-70E740481C1C}">
+                <a14:useLocalDpi xmlns:a14="http://schemas.microsoft.com/office/drawing/2010/main" val="0"/>
+              </a:ext>
+            </a:extLst>
+          </a:blip>
+          <a:stretch>
+            <a:fillRect/>
+          </a:stretch>
+        </p:blipFill>
+        <p:spPr>
+          <a:xfrm>
+            <a:off x="4950948" y="2079069"/>
+            <a:ext cx="2719137" cy="641784"/>
+          </a:xfrm>
+          <a:prstGeom prst="rect">
+            <a:avLst/>
+          </a:prstGeom>
+        </p:spPr>
+      </p:pic>
     </p:spTree>
     <p:extLst>
       <p:ext uri="{BB962C8B-B14F-4D97-AF65-F5344CB8AC3E}">
@@ -5123,41 +6517,14 @@
       </p:grpSpPr>
       <p:sp>
         <p:nvSpPr>
-          <p:cNvPr id="2" name="Titel 1"/>
-          <p:cNvSpPr>
-            <a:spLocks noGrp="1"/>
-          </p:cNvSpPr>
-          <p:nvPr>
-            <p:ph type="title"/>
-          </p:nvPr>
-        </p:nvSpPr>
-        <p:spPr/>
-        <p:txBody>
-          <a:bodyPr/>
-          <a:lstStyle/>
-          <a:p>
-            <a:r>
-              <a:rPr lang="de-DE" dirty="0" err="1" smtClean="0"/>
-              <a:t>Dockerfile</a:t>
-            </a:r>
-            <a:r>
-              <a:rPr lang="de-DE" dirty="0" smtClean="0"/>
-              <a:t> 1</a:t>
-            </a:r>
-            <a:endParaRPr lang="de-DE" dirty="0"/>
-          </a:p>
-        </p:txBody>
-      </p:sp>
-      <p:sp>
-        <p:nvSpPr>
           <p:cNvPr id="4" name="Textfeld 3"/>
           <p:cNvSpPr txBox="1"/>
           <p:nvPr/>
         </p:nvSpPr>
         <p:spPr>
           <a:xfrm>
-            <a:off x="1257339" y="2665865"/>
-            <a:ext cx="6484994" cy="1477328"/>
+            <a:off x="3173872" y="3052213"/>
+            <a:ext cx="2787943" cy="584776"/>
           </a:xfrm>
           <a:prstGeom prst="rect">
             <a:avLst/>
@@ -5170,88 +6537,19 @@
           </a:bodyPr>
           <a:lstStyle/>
           <a:p>
-            <a:r>
-              <a:rPr lang="de-DE" dirty="0"/>
-              <a:t>FROM ubuntu:14.04</a:t>
-            </a:r>
-          </a:p>
-          <a:p>
-            <a:endParaRPr lang="de-DE" dirty="0"/>
-          </a:p>
-          <a:p>
-            <a:r>
-              <a:rPr lang="de-DE" dirty="0"/>
-              <a:t>MAINTAINER Lukas </a:t>
-            </a:r>
-            <a:r>
-              <a:rPr lang="de-DE" dirty="0" err="1"/>
-              <a:t>Pustina</a:t>
-            </a:r>
-            <a:r>
-              <a:rPr lang="de-DE" dirty="0"/>
-              <a:t> &lt;</a:t>
-            </a:r>
-            <a:r>
-              <a:rPr lang="de-DE" dirty="0" err="1"/>
-              <a:t>lukas.pustina@codecentric.de</a:t>
-            </a:r>
-            <a:r>
-              <a:rPr lang="de-DE" dirty="0"/>
-              <a:t>&gt;</a:t>
-            </a:r>
-          </a:p>
-          <a:p>
-            <a:endParaRPr lang="de-DE" dirty="0"/>
-          </a:p>
-          <a:p>
-            <a:r>
-              <a:rPr lang="de-DE" dirty="0"/>
-              <a:t>RUN </a:t>
-            </a:r>
-            <a:r>
-              <a:rPr lang="de-DE" dirty="0" err="1"/>
-              <a:t>apt-get</a:t>
-            </a:r>
-            <a:r>
-              <a:rPr lang="de-DE" dirty="0"/>
-              <a:t> update &amp;&amp; </a:t>
-            </a:r>
-            <a:r>
-              <a:rPr lang="de-DE" dirty="0" err="1"/>
-              <a:t>apt-get</a:t>
-            </a:r>
-            <a:r>
-              <a:rPr lang="de-DE" dirty="0"/>
-              <a:t> </a:t>
-            </a:r>
-            <a:r>
-              <a:rPr lang="de-DE" dirty="0" err="1"/>
-              <a:t>install</a:t>
-            </a:r>
-            <a:r>
-              <a:rPr lang="de-DE" dirty="0"/>
-              <a:t> -</a:t>
-            </a:r>
-            <a:r>
-              <a:rPr lang="de-DE" dirty="0" err="1"/>
-              <a:t>y</a:t>
-            </a:r>
-            <a:r>
-              <a:rPr lang="de-DE" dirty="0"/>
-              <a:t> </a:t>
-            </a:r>
-            <a:r>
-              <a:rPr lang="de-DE" dirty="0" err="1"/>
-              <a:t>python</a:t>
-            </a:r>
-            <a:endParaRPr lang="de-DE" dirty="0"/>
+            <a:pPr algn="ctr"/>
+            <a:r>
+              <a:rPr lang="de-DE" sz="3200" dirty="0" err="1" smtClean="0"/>
+              <a:t>Virtualisierung</a:t>
+            </a:r>
+            <a:endParaRPr lang="de-DE" sz="3200" dirty="0"/>
           </a:p>
         </p:txBody>
       </p:sp>
     </p:spTree>
     <p:extLst>
       <p:ext uri="{BB962C8B-B14F-4D97-AF65-F5344CB8AC3E}">
-        <p14:creationId xmlns:p14="http://schemas.microsoft.com/office/powerpoint/2010/main" val="788210994"/>
+        <p14:creationId xmlns:p14="http://schemas.microsoft.com/office/powerpoint/2010/main" val="3122678935"/>
       </p:ext>
     </p:extLst>
   </p:cSld>
@@ -5287,46 +6585,14 @@
       </p:grpSpPr>
       <p:sp>
         <p:nvSpPr>
-          <p:cNvPr id="2" name="Titel 1"/>
-          <p:cNvSpPr>
-            <a:spLocks noGrp="1"/>
-          </p:cNvSpPr>
-          <p:nvPr>
-            <p:ph type="title"/>
-          </p:nvPr>
-        </p:nvSpPr>
-        <p:spPr>
-          <a:xfrm>
-            <a:off x="685800" y="121023"/>
-            <a:ext cx="7770813" cy="1429871"/>
-          </a:xfrm>
-        </p:spPr>
-        <p:txBody>
-          <a:bodyPr/>
-          <a:lstStyle/>
-          <a:p>
-            <a:r>
-              <a:rPr lang="de-DE" dirty="0" err="1" smtClean="0"/>
-              <a:t>Dockerfile</a:t>
-            </a:r>
-            <a:r>
-              <a:rPr lang="de-DE" dirty="0" smtClean="0"/>
-              <a:t> 2</a:t>
-            </a:r>
-            <a:endParaRPr lang="de-DE" dirty="0"/>
-          </a:p>
-        </p:txBody>
-      </p:sp>
-      <p:sp>
-        <p:nvSpPr>
           <p:cNvPr id="4" name="Textfeld 3"/>
           <p:cNvSpPr txBox="1"/>
           <p:nvPr/>
         </p:nvSpPr>
         <p:spPr>
           <a:xfrm>
-            <a:off x="917858" y="2099997"/>
-            <a:ext cx="6484994" cy="2862323"/>
+            <a:off x="1349768" y="969766"/>
+            <a:ext cx="6406522" cy="584776"/>
           </a:xfrm>
           <a:prstGeom prst="rect">
             <a:avLst/>
@@ -5340,166 +6606,61 @@
           <a:lstStyle/>
           <a:p>
             <a:r>
-              <a:rPr lang="de-DE" dirty="0"/>
-              <a:t>FROM </a:t>
-            </a:r>
-            <a:r>
-              <a:rPr lang="de-DE" dirty="0" err="1"/>
-              <a:t>lukaspustina</a:t>
-            </a:r>
-            <a:r>
-              <a:rPr lang="de-DE" dirty="0"/>
-              <a:t>/</a:t>
-            </a:r>
-            <a:r>
-              <a:rPr lang="de-DE" dirty="0" err="1"/>
-              <a:t>docker_demo_python</a:t>
-            </a:r>
-            <a:endParaRPr lang="de-DE" dirty="0"/>
-          </a:p>
-          <a:p>
-            <a:endParaRPr lang="de-DE" dirty="0"/>
-          </a:p>
-          <a:p>
-            <a:r>
-              <a:rPr lang="de-DE" dirty="0"/>
-              <a:t>MAINTAINER Lukas </a:t>
-            </a:r>
-            <a:r>
-              <a:rPr lang="de-DE" dirty="0" err="1"/>
-              <a:t>Pustina</a:t>
-            </a:r>
-            <a:r>
-              <a:rPr lang="de-DE" dirty="0"/>
-              <a:t> &lt;</a:t>
-            </a:r>
-            <a:r>
-              <a:rPr lang="de-DE" dirty="0" err="1"/>
-              <a:t>lukas.pustina@codecentric.de</a:t>
-            </a:r>
-            <a:r>
-              <a:rPr lang="de-DE" dirty="0"/>
-              <a:t>&gt;</a:t>
-            </a:r>
-          </a:p>
-          <a:p>
-            <a:endParaRPr lang="de-DE" dirty="0"/>
-          </a:p>
-          <a:p>
-            <a:r>
-              <a:rPr lang="de-DE" dirty="0"/>
-              <a:t>EXPOSE 8080</a:t>
-            </a:r>
-          </a:p>
-          <a:p>
-            <a:endParaRPr lang="de-DE" dirty="0"/>
-          </a:p>
-          <a:p>
-            <a:r>
-              <a:rPr lang="de-DE" dirty="0"/>
-              <a:t>ADD </a:t>
-            </a:r>
-            <a:r>
-              <a:rPr lang="de-DE" dirty="0" err="1"/>
-              <a:t>webserver.py</a:t>
-            </a:r>
-            <a:r>
-              <a:rPr lang="de-DE" dirty="0"/>
-              <a:t> /</a:t>
-            </a:r>
-            <a:r>
-              <a:rPr lang="de-DE" dirty="0" err="1"/>
-              <a:t>opt</a:t>
-            </a:r>
-            <a:r>
-              <a:rPr lang="de-DE" dirty="0"/>
-              <a:t>/</a:t>
-            </a:r>
-            <a:r>
-              <a:rPr lang="de-DE" dirty="0" err="1"/>
-              <a:t>webserver</a:t>
-            </a:r>
-            <a:r>
-              <a:rPr lang="de-DE" dirty="0"/>
-              <a:t>/</a:t>
-            </a:r>
-            <a:r>
-              <a:rPr lang="de-DE" dirty="0" err="1"/>
-              <a:t>webserver.py</a:t>
-            </a:r>
-            <a:endParaRPr lang="de-DE" dirty="0"/>
-          </a:p>
-          <a:p>
-            <a:r>
-              <a:rPr lang="de-DE" dirty="0"/>
-              <a:t>ADD </a:t>
-            </a:r>
-            <a:r>
-              <a:rPr lang="de-DE" dirty="0" err="1"/>
-              <a:t>run.sh</a:t>
-            </a:r>
-            <a:r>
-              <a:rPr lang="de-DE" dirty="0"/>
-              <a:t> /</a:t>
-            </a:r>
-            <a:r>
-              <a:rPr lang="de-DE" dirty="0" err="1"/>
-              <a:t>opt</a:t>
-            </a:r>
-            <a:r>
-              <a:rPr lang="de-DE" dirty="0"/>
-              <a:t>/</a:t>
-            </a:r>
-            <a:r>
-              <a:rPr lang="de-DE" dirty="0" err="1"/>
-              <a:t>webserver</a:t>
-            </a:r>
-            <a:r>
-              <a:rPr lang="de-DE" dirty="0"/>
-              <a:t>/</a:t>
-            </a:r>
-            <a:r>
-              <a:rPr lang="de-DE" dirty="0" err="1"/>
-              <a:t>run.sh</a:t>
-            </a:r>
-            <a:endParaRPr lang="de-DE" dirty="0"/>
-          </a:p>
-          <a:p>
-            <a:endParaRPr lang="de-DE" dirty="0"/>
-          </a:p>
-          <a:p>
-            <a:r>
-              <a:rPr lang="de-DE" dirty="0"/>
-              <a:t>VOLUME ["/</a:t>
-            </a:r>
-            <a:r>
-              <a:rPr lang="de-DE" dirty="0" err="1"/>
-              <a:t>logs</a:t>
-            </a:r>
-            <a:r>
-              <a:rPr lang="de-DE" dirty="0"/>
-              <a:t>"]</a:t>
-            </a:r>
-          </a:p>
-        </p:txBody>
-      </p:sp>
+              <a:rPr lang="de-DE" sz="3200" dirty="0" smtClean="0"/>
+              <a:t>Stapelbare Dateisysteme (</a:t>
+            </a:r>
+            <a:r>
+              <a:rPr lang="de-DE" sz="3200" dirty="0" err="1" smtClean="0"/>
+              <a:t>UnionFS</a:t>
+            </a:r>
+            <a:r>
+              <a:rPr lang="de-DE" sz="3200" dirty="0" smtClean="0"/>
+              <a:t>)</a:t>
+            </a:r>
+            <a:endParaRPr lang="de-DE" sz="3200" dirty="0"/>
+          </a:p>
+        </p:txBody>
+      </p:sp>
+      <p:pic>
+        <p:nvPicPr>
+          <p:cNvPr id="5" name="Bild 4" descr="docker-filesystems-multilayer.png"/>
+          <p:cNvPicPr>
+            <a:picLocks noChangeAspect="1"/>
+          </p:cNvPicPr>
+          <p:nvPr/>
+        </p:nvPicPr>
+        <p:blipFill>
+          <a:blip r:embed="rId2">
+            <a:extLst>
+              <a:ext uri="{28A0092B-C50C-407E-A947-70E740481C1C}">
+                <a14:useLocalDpi xmlns:a14="http://schemas.microsoft.com/office/drawing/2010/main" val="0"/>
+              </a:ext>
+            </a:extLst>
+          </a:blip>
+          <a:stretch>
+            <a:fillRect/>
+          </a:stretch>
+        </p:blipFill>
+        <p:spPr>
+          <a:xfrm>
+            <a:off x="1876664" y="2028832"/>
+            <a:ext cx="5326694" cy="3995021"/>
+          </a:xfrm>
+          <a:prstGeom prst="rect">
+            <a:avLst/>
+          </a:prstGeom>
+        </p:spPr>
+      </p:pic>
     </p:spTree>
     <p:extLst>
       <p:ext uri="{BB962C8B-B14F-4D97-AF65-F5344CB8AC3E}">
-        <p14:creationId xmlns:p14="http://schemas.microsoft.com/office/powerpoint/2010/main" val="2566868290"/>
+        <p14:creationId xmlns:p14="http://schemas.microsoft.com/office/powerpoint/2010/main" val="1918630265"/>
       </p:ext>
     </p:extLst>
   </p:cSld>
   <p:clrMapOvr>
     <a:masterClrMapping/>
   </p:clrMapOvr>
-  <p:timing>
-    <p:tnLst>
-      <p:par>
-        <p:cTn xmlns:p14="http://schemas.microsoft.com/office/powerpoint/2010/main" id="1" dur="indefinite" restart="never" nodeType="tmRoot"/>
-      </p:par>
-    </p:tnLst>
-  </p:timing>
 </p:sld>
 </file>
 
@@ -5536,8 +6697,8 @@
           <a:lstStyle/>
           <a:p>
             <a:r>
-              <a:rPr lang="de-DE" dirty="0" err="1" smtClean="0"/>
-              <a:t>Build</a:t>
+              <a:rPr lang="de-DE" dirty="0" smtClean="0"/>
+              <a:t>Beispiel</a:t>
             </a:r>
             <a:endParaRPr lang="de-DE" dirty="0"/>
           </a:p>
@@ -5545,14 +6706,94 @@
       </p:sp>
       <p:sp>
         <p:nvSpPr>
-          <p:cNvPr id="4" name="Textfeld 3"/>
+          <p:cNvPr id="6" name="Rechteck 5"/>
+          <p:cNvSpPr/>
+          <p:nvPr/>
+        </p:nvSpPr>
+        <p:spPr>
+          <a:xfrm>
+            <a:off x="966766" y="1706206"/>
+            <a:ext cx="7317095" cy="4379261"/>
+          </a:xfrm>
+          <a:prstGeom prst="rect">
+            <a:avLst/>
+          </a:prstGeom>
+        </p:spPr>
+        <p:style>
+          <a:lnRef idx="3">
+            <a:schemeClr val="lt1"/>
+          </a:lnRef>
+          <a:fillRef idx="1">
+            <a:schemeClr val="accent2"/>
+          </a:fillRef>
+          <a:effectRef idx="1">
+            <a:schemeClr val="accent2"/>
+          </a:effectRef>
+          <a:fontRef idx="minor">
+            <a:schemeClr val="lt1"/>
+          </a:fontRef>
+        </p:style>
+        <p:txBody>
+          <a:bodyPr rtlCol="0" anchor="ctr"/>
+          <a:lstStyle/>
+          <a:p>
+            <a:pPr algn="ctr"/>
+            <a:r>
+              <a:rPr lang="de-DE" dirty="0" smtClean="0"/>
+              <a:t>h</a:t>
+            </a:r>
+            <a:endParaRPr lang="de-DE" dirty="0"/>
+          </a:p>
+        </p:txBody>
+      </p:sp>
+      <p:sp>
+        <p:nvSpPr>
+          <p:cNvPr id="7" name="Rechteck 6"/>
+          <p:cNvSpPr/>
+          <p:nvPr/>
+        </p:nvSpPr>
+        <p:spPr>
+          <a:xfrm>
+            <a:off x="1611279" y="2673055"/>
+            <a:ext cx="5895380" cy="2938465"/>
+          </a:xfrm>
+          <a:prstGeom prst="rect">
+            <a:avLst/>
+          </a:prstGeom>
+        </p:spPr>
+        <p:style>
+          <a:lnRef idx="1">
+            <a:schemeClr val="accent1"/>
+          </a:lnRef>
+          <a:fillRef idx="3">
+            <a:schemeClr val="accent1"/>
+          </a:fillRef>
+          <a:effectRef idx="2">
+            <a:schemeClr val="accent1"/>
+          </a:effectRef>
+          <a:fontRef idx="minor">
+            <a:schemeClr val="lt1"/>
+          </a:fontRef>
+        </p:style>
+        <p:txBody>
+          <a:bodyPr rtlCol="0" anchor="ctr"/>
+          <a:lstStyle/>
+          <a:p>
+            <a:pPr algn="ctr"/>
+            <a:endParaRPr lang="de-DE" dirty="0"/>
+          </a:p>
+        </p:txBody>
+      </p:sp>
+      <p:sp>
+        <p:nvSpPr>
+          <p:cNvPr id="8" name="Textfeld 7"/>
           <p:cNvSpPr txBox="1"/>
           <p:nvPr/>
         </p:nvSpPr>
         <p:spPr>
           <a:xfrm>
-            <a:off x="1402483" y="3151621"/>
-            <a:ext cx="6006773" cy="369332"/>
+            <a:off x="1857707" y="1962483"/>
+            <a:ext cx="4663228" cy="369332"/>
           </a:xfrm>
           <a:prstGeom prst="rect">
             <a:avLst/>
@@ -5560,60 +6801,29 @@
           <a:noFill/>
         </p:spPr>
         <p:txBody>
-          <a:bodyPr wrap="none" rtlCol="0">
+          <a:bodyPr wrap="square" rtlCol="0">
             <a:spAutoFit/>
           </a:bodyPr>
           <a:lstStyle/>
           <a:p>
             <a:r>
-              <a:rPr lang="de-DE" dirty="0" err="1"/>
-              <a:t>docker</a:t>
-            </a:r>
-            <a:r>
-              <a:rPr lang="de-DE" dirty="0"/>
-              <a:t> </a:t>
-            </a:r>
-            <a:r>
-              <a:rPr lang="de-DE" dirty="0" err="1" smtClean="0"/>
-              <a:t>build</a:t>
-            </a:r>
-            <a:r>
               <a:rPr lang="de-DE" dirty="0" smtClean="0"/>
-              <a:t> </a:t>
-            </a:r>
-            <a:r>
-              <a:rPr lang="de-DE" dirty="0"/>
-              <a:t>--</a:t>
-            </a:r>
-            <a:r>
-              <a:rPr lang="de-DE" dirty="0" err="1"/>
-              <a:t>force-rm</a:t>
-            </a:r>
-            <a:r>
-              <a:rPr lang="de-DE" dirty="0"/>
-              <a:t> –t ra1f/</a:t>
-            </a:r>
-            <a:r>
-              <a:rPr lang="de-DE" dirty="0" err="1"/>
-              <a:t>docker_intro_groovy</a:t>
-            </a:r>
-            <a:r>
-              <a:rPr lang="de-DE" dirty="0"/>
-              <a:t> groovy</a:t>
-            </a:r>
-          </a:p>
-        </p:txBody>
-      </p:sp>
-      <p:sp>
-        <p:nvSpPr>
-          <p:cNvPr id="5" name="Textfeld 4"/>
+              <a:t>Reales System (ohne Linux-Kernel)</a:t>
+            </a:r>
+            <a:endParaRPr lang="de-DE" dirty="0"/>
+          </a:p>
+        </p:txBody>
+      </p:sp>
+      <p:sp>
+        <p:nvSpPr>
+          <p:cNvPr id="9" name="Textfeld 8"/>
           <p:cNvSpPr txBox="1"/>
           <p:nvPr/>
         </p:nvSpPr>
         <p:spPr>
           <a:xfrm>
-            <a:off x="1402483" y="3738682"/>
-            <a:ext cx="6597029" cy="369332"/>
+            <a:off x="1857707" y="2739754"/>
+            <a:ext cx="3886022" cy="369332"/>
           </a:xfrm>
           <a:prstGeom prst="rect">
             <a:avLst/>
@@ -5621,83 +6831,14 @@
           <a:noFill/>
         </p:spPr>
         <p:txBody>
-          <a:bodyPr wrap="none" rtlCol="0">
+          <a:bodyPr wrap="square" rtlCol="0">
             <a:spAutoFit/>
           </a:bodyPr>
           <a:lstStyle/>
           <a:p>
             <a:r>
-              <a:rPr lang="de-DE" dirty="0" err="1"/>
-              <a:t>docker</a:t>
-            </a:r>
-            <a:r>
-              <a:rPr lang="de-DE" dirty="0"/>
-              <a:t> </a:t>
-            </a:r>
-            <a:r>
-              <a:rPr lang="de-DE" dirty="0" err="1" smtClean="0"/>
-              <a:t>build</a:t>
-            </a:r>
-            <a:r>
               <a:rPr lang="de-DE" dirty="0" smtClean="0"/>
-              <a:t> </a:t>
-            </a:r>
-            <a:r>
-              <a:rPr lang="de-DE" dirty="0"/>
-              <a:t>--</a:t>
-            </a:r>
-            <a:r>
-              <a:rPr lang="de-DE" dirty="0" err="1"/>
-              <a:t>force-rm</a:t>
-            </a:r>
-            <a:r>
-              <a:rPr lang="de-DE" dirty="0"/>
-              <a:t> –t ra1f/</a:t>
-            </a:r>
-            <a:r>
-              <a:rPr lang="de-DE" dirty="0" err="1"/>
-              <a:t>docker_intro_webserver</a:t>
-            </a:r>
-            <a:r>
-              <a:rPr lang="de-DE" dirty="0"/>
-              <a:t> webserver</a:t>
-            </a:r>
-          </a:p>
-        </p:txBody>
-      </p:sp>
-      <p:sp>
-        <p:nvSpPr>
-          <p:cNvPr id="6" name="Textfeld 5"/>
-          <p:cNvSpPr txBox="1"/>
-          <p:nvPr/>
-        </p:nvSpPr>
-        <p:spPr>
-          <a:xfrm>
-            <a:off x="1402483" y="4459403"/>
-            <a:ext cx="1579579" cy="369332"/>
-          </a:xfrm>
-          <a:prstGeom prst="rect">
-            <a:avLst/>
-          </a:prstGeom>
-          <a:noFill/>
-        </p:spPr>
-        <p:txBody>
-          <a:bodyPr wrap="none" rtlCol="0">
-            <a:spAutoFit/>
-          </a:bodyPr>
-          <a:lstStyle/>
-          <a:p>
-            <a:r>
-              <a:rPr lang="de-DE" dirty="0" err="1"/>
-              <a:t>docker</a:t>
-            </a:r>
-            <a:r>
-              <a:rPr lang="de-DE" dirty="0"/>
-              <a:t> </a:t>
-            </a:r>
-            <a:r>
-              <a:rPr lang="de-DE" dirty="0" err="1"/>
-              <a:t>images</a:t>
+              <a:t>Virtuelles Hostsystem (Linux)</a:t>
             </a:r>
             <a:endParaRPr lang="de-DE" dirty="0"/>
           </a:p>
@@ -5706,7 +6847,7 @@
     </p:spTree>
     <p:extLst>
       <p:ext uri="{BB962C8B-B14F-4D97-AF65-F5344CB8AC3E}">
-        <p14:creationId xmlns:p14="http://schemas.microsoft.com/office/powerpoint/2010/main" val="989218148"/>
+        <p14:creationId xmlns:p14="http://schemas.microsoft.com/office/powerpoint/2010/main" val="3547949617"/>
       </p:ext>
     </p:extLst>
   </p:cSld>
@@ -5748,7 +6889,15 @@
           <a:bodyPr/>
           <a:lstStyle/>
           <a:p>
-            <a:endParaRPr lang="de-DE"/>
+            <a:r>
+              <a:rPr lang="de-DE" dirty="0" err="1" smtClean="0"/>
+              <a:t>Dockerfile</a:t>
+            </a:r>
+            <a:r>
+              <a:rPr lang="de-DE" dirty="0" smtClean="0"/>
+              <a:t> 1</a:t>
+            </a:r>
+            <a:endParaRPr lang="de-DE" dirty="0"/>
           </a:p>
         </p:txBody>
       </p:sp>
@@ -5760,8 +6909,8 @@
         </p:nvSpPr>
         <p:spPr>
           <a:xfrm>
-            <a:off x="181990" y="1676954"/>
-            <a:ext cx="8858280" cy="4031873"/>
+            <a:off x="1257339" y="2665865"/>
+            <a:ext cx="6484994" cy="1477328"/>
           </a:xfrm>
           <a:prstGeom prst="rect">
             <a:avLst/>
@@ -5769,246 +6918,106 @@
           <a:noFill/>
         </p:spPr>
         <p:txBody>
-          <a:bodyPr wrap="square" rtlCol="0">
+          <a:bodyPr wrap="none" rtlCol="0">
             <a:spAutoFit/>
           </a:bodyPr>
           <a:lstStyle/>
           <a:p>
             <a:r>
-              <a:rPr lang="de-DE" sz="1600" dirty="0" err="1"/>
-              <a:t>vagrant@docker-intro</a:t>
-            </a:r>
-            <a:r>
-              <a:rPr lang="de-DE" sz="1600" dirty="0"/>
-              <a:t>:/</a:t>
-            </a:r>
-            <a:r>
-              <a:rPr lang="de-DE" sz="1600" dirty="0" err="1"/>
-              <a:t>vagrant</a:t>
-            </a:r>
-            <a:r>
-              <a:rPr lang="de-DE" sz="1600" dirty="0"/>
-              <a:t>$ </a:t>
-            </a:r>
-            <a:r>
-              <a:rPr lang="de-DE" sz="1600" dirty="0" err="1"/>
-              <a:t>docker</a:t>
-            </a:r>
-            <a:r>
-              <a:rPr lang="de-DE" sz="1600" dirty="0"/>
+              <a:rPr lang="de-DE" dirty="0"/>
+              <a:t>FROM ubuntu:14.04</a:t>
+            </a:r>
+          </a:p>
+          <a:p>
+            <a:endParaRPr lang="de-DE" dirty="0"/>
+          </a:p>
+          <a:p>
+            <a:r>
+              <a:rPr lang="de-DE" dirty="0"/>
+              <a:t>MAINTAINER Lukas </a:t>
+            </a:r>
+            <a:r>
+              <a:rPr lang="de-DE" dirty="0" err="1"/>
+              <a:t>Pustina</a:t>
+            </a:r>
+            <a:r>
+              <a:rPr lang="de-DE" dirty="0"/>
+              <a:t> &lt;</a:t>
+            </a:r>
+            <a:r>
+              <a:rPr lang="de-DE" dirty="0" err="1"/>
+              <a:t>lukas.pustina@codecentric.de</a:t>
+            </a:r>
+            <a:r>
+              <a:rPr lang="de-DE" dirty="0"/>
+              <a:t>&gt;</a:t>
+            </a:r>
+          </a:p>
+          <a:p>
+            <a:endParaRPr lang="de-DE" dirty="0"/>
+          </a:p>
+          <a:p>
+            <a:r>
+              <a:rPr lang="de-DE" dirty="0"/>
+              <a:t>RUN </a:t>
+            </a:r>
+            <a:r>
+              <a:rPr lang="de-DE" dirty="0" err="1"/>
+              <a:t>apt-get</a:t>
+            </a:r>
+            <a:r>
+              <a:rPr lang="de-DE" dirty="0"/>
+              <a:t> update &amp;&amp; </a:t>
+            </a:r>
+            <a:r>
+              <a:rPr lang="de-DE" dirty="0" err="1"/>
+              <a:t>apt-get</a:t>
+            </a:r>
+            <a:r>
+              <a:rPr lang="de-DE" dirty="0"/>
               <a:t> </a:t>
             </a:r>
             <a:r>
-              <a:rPr lang="de-DE" sz="1600" dirty="0" err="1"/>
-              <a:t>images</a:t>
-            </a:r>
-            <a:r>
-              <a:rPr lang="de-DE" sz="1600" dirty="0"/>
+              <a:rPr lang="de-DE" dirty="0" err="1"/>
+              <a:t>install</a:t>
+            </a:r>
+            <a:r>
+              <a:rPr lang="de-DE" dirty="0"/>
+              <a:t> -</a:t>
+            </a:r>
+            <a:r>
+              <a:rPr lang="de-DE" dirty="0" err="1"/>
+              <a:t>y</a:t>
+            </a:r>
+            <a:r>
+              <a:rPr lang="de-DE" dirty="0"/>
               <a:t> </a:t>
             </a:r>
             <a:r>
-              <a:rPr lang="de-DE" sz="1600" dirty="0" smtClean="0"/>
-              <a:t>–</a:t>
-            </a:r>
-            <a:r>
-              <a:rPr lang="de-DE" sz="1600" dirty="0" err="1" smtClean="0"/>
-              <a:t>tree</a:t>
-            </a:r>
-            <a:endParaRPr lang="de-DE" sz="1600" dirty="0"/>
-          </a:p>
-          <a:p>
-            <a:r>
-              <a:rPr lang="en-US" sz="1600" dirty="0" smtClean="0"/>
-              <a:t>└</a:t>
-            </a:r>
-            <a:r>
-              <a:rPr lang="en-US" sz="1600" dirty="0"/>
-              <a:t>─511136ea3c5a Virtual Size: 0 B</a:t>
-            </a:r>
-          </a:p>
-          <a:p>
-            <a:r>
-              <a:rPr lang="nl-NL" sz="1600" dirty="0"/>
-              <a:t>  └─fa4fd76b09ce Virtual </a:t>
-            </a:r>
-            <a:r>
-              <a:rPr lang="nl-NL" sz="1600" dirty="0" err="1"/>
-              <a:t>Size</a:t>
-            </a:r>
-            <a:r>
-              <a:rPr lang="nl-NL" sz="1600" dirty="0"/>
-              <a:t>: 188.1 MB</a:t>
-            </a:r>
-          </a:p>
-          <a:p>
-            <a:r>
-              <a:rPr lang="en-US" sz="1600" dirty="0"/>
-              <a:t>    └─1c8294cc5160 Virtual Size: 188.3 MB</a:t>
-            </a:r>
-          </a:p>
-          <a:p>
-            <a:r>
-              <a:rPr lang="fi-FI" sz="1600" dirty="0"/>
-              <a:t>      └─117ee323aaa9 </a:t>
-            </a:r>
-            <a:r>
-              <a:rPr lang="fi-FI" sz="1600" dirty="0" err="1"/>
-              <a:t>Virtual</a:t>
-            </a:r>
-            <a:r>
-              <a:rPr lang="fi-FI" sz="1600" dirty="0"/>
-              <a:t> </a:t>
-            </a:r>
-            <a:r>
-              <a:rPr lang="fi-FI" sz="1600" dirty="0" err="1"/>
-              <a:t>Size</a:t>
-            </a:r>
-            <a:r>
-              <a:rPr lang="fi-FI" sz="1600" dirty="0"/>
-              <a:t>: 188.3 MB</a:t>
-            </a:r>
-          </a:p>
-          <a:p>
-            <a:r>
-              <a:rPr lang="fi-FI" sz="1600" dirty="0"/>
-              <a:t>        └─2d24f826cb16 </a:t>
-            </a:r>
-            <a:r>
-              <a:rPr lang="fi-FI" sz="1600" dirty="0" err="1"/>
-              <a:t>Virtual</a:t>
-            </a:r>
-            <a:r>
-              <a:rPr lang="fi-FI" sz="1600" dirty="0"/>
-              <a:t> </a:t>
-            </a:r>
-            <a:r>
-              <a:rPr lang="fi-FI" sz="1600" dirty="0" err="1"/>
-              <a:t>Size</a:t>
-            </a:r>
-            <a:r>
-              <a:rPr lang="fi-FI" sz="1600" dirty="0"/>
-              <a:t>: 188.3 MB </a:t>
-            </a:r>
-            <a:r>
-              <a:rPr lang="fi-FI" sz="1600" dirty="0" err="1"/>
-              <a:t>Tags</a:t>
-            </a:r>
-            <a:r>
-              <a:rPr lang="fi-FI" sz="1600" dirty="0"/>
-              <a:t>: ubuntu:14.04, ubuntu:14.04.2, </a:t>
-            </a:r>
-            <a:r>
-              <a:rPr lang="fi-FI" sz="1600" dirty="0" err="1"/>
-              <a:t>ubuntu:latest</a:t>
-            </a:r>
-            <a:r>
-              <a:rPr lang="fi-FI" sz="1600" dirty="0"/>
-              <a:t>, </a:t>
-            </a:r>
-            <a:r>
-              <a:rPr lang="fi-FI" sz="1600" dirty="0" err="1"/>
-              <a:t>ubuntu:trusty</a:t>
-            </a:r>
-            <a:r>
-              <a:rPr lang="fi-FI" sz="1600" dirty="0"/>
-              <a:t>, ubuntu:trusty-20150218.1</a:t>
-            </a:r>
-          </a:p>
-          <a:p>
-            <a:r>
-              <a:rPr lang="nl-NL" sz="1600" dirty="0"/>
-              <a:t>          └─fdce9251e6bf Virtual </a:t>
-            </a:r>
-            <a:r>
-              <a:rPr lang="nl-NL" sz="1600" dirty="0" err="1"/>
-              <a:t>Size</a:t>
-            </a:r>
-            <a:r>
-              <a:rPr lang="nl-NL" sz="1600" dirty="0"/>
-              <a:t>: 188.3 MB</a:t>
-            </a:r>
-          </a:p>
-          <a:p>
-            <a:r>
-              <a:rPr lang="en-US" sz="1600" dirty="0"/>
-              <a:t>            └─5e99d9973e1a Virtual Size: 188.3 MB</a:t>
-            </a:r>
-          </a:p>
-          <a:p>
-            <a:r>
-              <a:rPr lang="en-US" sz="1600" dirty="0"/>
-              <a:t>              └─9a60cbf2ae2f Virtual Size: 570.3 MB</a:t>
-            </a:r>
-          </a:p>
-          <a:p>
-            <a:r>
-              <a:rPr lang="en-US" sz="1600" dirty="0"/>
-              <a:t>                └─32000bf385d5 Virtual Size: 572.7 MB</a:t>
-            </a:r>
-          </a:p>
-          <a:p>
-            <a:r>
-              <a:rPr lang="en-US" sz="1600" dirty="0"/>
-              <a:t>                  └─9c97d28b0d55 Virtual Size: 575.8 MB</a:t>
-            </a:r>
-          </a:p>
-          <a:p>
-            <a:r>
-              <a:rPr lang="en-US" sz="1600" dirty="0"/>
-              <a:t>                    └─962dba9dfa39 Virtual Size: 575.8 MB</a:t>
-            </a:r>
-          </a:p>
-          <a:p>
-            <a:r>
-              <a:rPr lang="en-US" sz="1600" dirty="0"/>
-              <a:t>                      └─374ea2adf24e Virtual Size: 575.8 MB</a:t>
-            </a:r>
-          </a:p>
-          <a:p>
-            <a:r>
-              <a:rPr lang="fi-FI" sz="1600" dirty="0"/>
-              <a:t>                        └─c67aa605647c </a:t>
-            </a:r>
-            <a:r>
-              <a:rPr lang="fi-FI" sz="1600" dirty="0" err="1"/>
-              <a:t>Virtual</a:t>
-            </a:r>
-            <a:r>
-              <a:rPr lang="fi-FI" sz="1600" dirty="0"/>
-              <a:t> </a:t>
-            </a:r>
-            <a:r>
-              <a:rPr lang="fi-FI" sz="1600" dirty="0" err="1"/>
-              <a:t>Size</a:t>
-            </a:r>
-            <a:r>
-              <a:rPr lang="fi-FI" sz="1600" dirty="0"/>
-              <a:t>: 575.8 MB</a:t>
-            </a:r>
-          </a:p>
-          <a:p>
-            <a:r>
-              <a:rPr lang="en-US" sz="1600" dirty="0"/>
-              <a:t>                          └─6336aee1007d Virtual Size: 643.3 MB Tags: ra1f/</a:t>
-            </a:r>
-            <a:r>
-              <a:rPr lang="en-US" sz="1600" dirty="0" err="1"/>
-              <a:t>docker_intro_groovy:latest</a:t>
-            </a:r>
-            <a:endParaRPr lang="de-DE" sz="1600" dirty="0"/>
+              <a:rPr lang="de-DE" dirty="0" err="1"/>
+              <a:t>python</a:t>
+            </a:r>
+            <a:endParaRPr lang="de-DE" dirty="0"/>
           </a:p>
         </p:txBody>
       </p:sp>
     </p:spTree>
     <p:extLst>
       <p:ext uri="{BB962C8B-B14F-4D97-AF65-F5344CB8AC3E}">
-        <p14:creationId xmlns:p14="http://schemas.microsoft.com/office/powerpoint/2010/main" val="3651636047"/>
+        <p14:creationId xmlns:p14="http://schemas.microsoft.com/office/powerpoint/2010/main" val="788210994"/>
       </p:ext>
     </p:extLst>
   </p:cSld>
   <p:clrMapOvr>
     <a:masterClrMapping/>
   </p:clrMapOvr>
+  <p:timing>
+    <p:tnLst>
+      <p:par>
+        <p:cTn xmlns:p14="http://schemas.microsoft.com/office/powerpoint/2010/main" id="1" dur="indefinite" restart="never" nodeType="tmRoot"/>
+      </p:par>
+    </p:tnLst>
+  </p:timing>
 </p:sld>
 </file>
 
@@ -6039,25 +7048,38 @@
             <p:ph type="title"/>
           </p:nvPr>
         </p:nvSpPr>
-        <p:spPr/>
+        <p:spPr>
+          <a:xfrm>
+            <a:off x="685800" y="121023"/>
+            <a:ext cx="7770813" cy="1429871"/>
+          </a:xfrm>
+        </p:spPr>
         <p:txBody>
           <a:bodyPr/>
           <a:lstStyle/>
           <a:p>
-            <a:endParaRPr lang="de-DE"/>
-          </a:p>
-        </p:txBody>
-      </p:sp>
-      <p:sp>
-        <p:nvSpPr>
-          <p:cNvPr id="5" name="Textfeld 4"/>
+            <a:r>
+              <a:rPr lang="de-DE" dirty="0" err="1" smtClean="0"/>
+              <a:t>Dockerfile</a:t>
+            </a:r>
+            <a:r>
+              <a:rPr lang="de-DE" dirty="0" smtClean="0"/>
+              <a:t> 2</a:t>
+            </a:r>
+            <a:endParaRPr lang="de-DE" dirty="0"/>
+          </a:p>
+        </p:txBody>
+      </p:sp>
+      <p:sp>
+        <p:nvSpPr>
+          <p:cNvPr id="4" name="Textfeld 3"/>
           <p:cNvSpPr txBox="1"/>
           <p:nvPr/>
         </p:nvSpPr>
         <p:spPr>
           <a:xfrm>
-            <a:off x="156844" y="1676954"/>
-            <a:ext cx="8858280" cy="2308324"/>
+            <a:off x="917858" y="2099997"/>
+            <a:ext cx="6484994" cy="2862323"/>
           </a:xfrm>
           <a:prstGeom prst="rect">
             <a:avLst/>
@@ -6065,198 +7087,172 @@
           <a:noFill/>
         </p:spPr>
         <p:txBody>
-          <a:bodyPr wrap="square" rtlCol="0">
+          <a:bodyPr wrap="none" rtlCol="0">
             <a:spAutoFit/>
           </a:bodyPr>
           <a:lstStyle/>
           <a:p>
             <a:r>
-              <a:rPr lang="fi-FI" sz="1600" dirty="0" smtClean="0"/>
-              <a:t>…</a:t>
-            </a:r>
-          </a:p>
-          <a:p>
-            <a:r>
-              <a:rPr lang="fi-FI" sz="1600" dirty="0" smtClean="0"/>
-              <a:t>└</a:t>
-            </a:r>
-            <a:r>
-              <a:rPr lang="fi-FI" sz="1600" dirty="0"/>
-              <a:t>─c67aa605647c </a:t>
-            </a:r>
-            <a:r>
-              <a:rPr lang="fi-FI" sz="1600" dirty="0" err="1"/>
-              <a:t>Virtual</a:t>
-            </a:r>
-            <a:r>
-              <a:rPr lang="fi-FI" sz="1600" dirty="0"/>
-              <a:t> </a:t>
-            </a:r>
-            <a:r>
-              <a:rPr lang="fi-FI" sz="1600" dirty="0" err="1"/>
-              <a:t>Size</a:t>
-            </a:r>
-            <a:r>
-              <a:rPr lang="fi-FI" sz="1600" dirty="0"/>
-              <a:t>: 575.8 MB</a:t>
-            </a:r>
-          </a:p>
-          <a:p>
-            <a:r>
-              <a:rPr lang="en-US" sz="1600" dirty="0"/>
-              <a:t> </a:t>
-            </a:r>
-            <a:r>
-              <a:rPr lang="en-US" sz="1600" dirty="0"/>
-              <a:t> </a:t>
-            </a:r>
-            <a:r>
-              <a:rPr lang="en-US" sz="1600" dirty="0" smtClean="0"/>
-              <a:t> └</a:t>
-            </a:r>
-            <a:r>
-              <a:rPr lang="en-US" sz="1600" dirty="0"/>
-              <a:t>─6336aee1007d Virtual Size: 643.3 MB Tags: ra1f/</a:t>
-            </a:r>
-            <a:r>
-              <a:rPr lang="en-US" sz="1600" dirty="0" err="1"/>
-              <a:t>docker_intro_groovy:latest</a:t>
-            </a:r>
-            <a:endParaRPr lang="en-US" sz="1600" dirty="0"/>
-          </a:p>
-          <a:p>
-            <a:r>
-              <a:rPr lang="en-US" sz="1600" dirty="0"/>
-              <a:t>       </a:t>
-            </a:r>
-            <a:r>
-              <a:rPr lang="en-US" sz="1600" dirty="0" smtClean="0"/>
-              <a:t>└─</a:t>
-            </a:r>
-            <a:r>
-              <a:rPr lang="en-US" sz="1600" dirty="0"/>
-              <a:t>d33ff67873b2 Virtual Size: 643.3 MB</a:t>
-            </a:r>
-          </a:p>
-          <a:p>
-            <a:r>
-              <a:rPr lang="en-US" sz="1600" dirty="0"/>
-              <a:t>           </a:t>
-            </a:r>
-            <a:r>
-              <a:rPr lang="en-US" sz="1600" dirty="0" smtClean="0"/>
-              <a:t>└─</a:t>
-            </a:r>
-            <a:r>
-              <a:rPr lang="en-US" sz="1600" dirty="0"/>
-              <a:t>0470c866273e Virtual Size: 643.3 MB</a:t>
-            </a:r>
-          </a:p>
-          <a:p>
-            <a:r>
-              <a:rPr lang="en-US" sz="1600" dirty="0"/>
-              <a:t>               </a:t>
-            </a:r>
-            <a:r>
-              <a:rPr lang="en-US" sz="1600" dirty="0" smtClean="0"/>
-              <a:t>└─</a:t>
-            </a:r>
-            <a:r>
-              <a:rPr lang="en-US" sz="1600" dirty="0"/>
-              <a:t>75ba993b078c Virtual Size: 643.3 MB</a:t>
-            </a:r>
-          </a:p>
-          <a:p>
-            <a:r>
-              <a:rPr lang="en-US" sz="1600" dirty="0"/>
-              <a:t>                  </a:t>
-            </a:r>
-            <a:r>
-              <a:rPr lang="en-US" sz="1600" dirty="0"/>
-              <a:t> </a:t>
-            </a:r>
-            <a:r>
-              <a:rPr lang="en-US" sz="1600" dirty="0" smtClean="0"/>
-              <a:t>└</a:t>
-            </a:r>
-            <a:r>
-              <a:rPr lang="en-US" sz="1600" dirty="0"/>
-              <a:t>─97fcbbab0d06 Virtual Size: 643.3 MB</a:t>
-            </a:r>
-          </a:p>
-          <a:p>
-            <a:r>
-              <a:rPr lang="en-US" sz="1600" dirty="0"/>
-              <a:t>                   </a:t>
-            </a:r>
-            <a:r>
-              <a:rPr lang="en-US" sz="1600" dirty="0"/>
-              <a:t> </a:t>
-            </a:r>
-            <a:r>
-              <a:rPr lang="en-US" sz="1600" dirty="0" smtClean="0"/>
-              <a:t>   └</a:t>
-            </a:r>
-            <a:r>
-              <a:rPr lang="en-US" sz="1600" dirty="0"/>
-              <a:t>─93ef859422de Virtual Size: 643.3 MB</a:t>
-            </a:r>
-          </a:p>
-          <a:p>
-            <a:r>
-              <a:rPr lang="sv-SE" sz="1600" dirty="0"/>
-              <a:t>                         </a:t>
-            </a:r>
-            <a:r>
-              <a:rPr lang="sv-SE" sz="1600"/>
-              <a:t> </a:t>
-            </a:r>
-            <a:r>
-              <a:rPr lang="sv-SE" sz="1600"/>
-              <a:t> </a:t>
-            </a:r>
-            <a:r>
-              <a:rPr lang="sv-SE" sz="1600" smtClean="0"/>
-              <a:t> └</a:t>
-            </a:r>
-            <a:r>
-              <a:rPr lang="sv-SE" sz="1600" dirty="0"/>
-              <a:t>─f466026ee004 </a:t>
-            </a:r>
-            <a:r>
-              <a:rPr lang="sv-SE" sz="1600" dirty="0" err="1"/>
-              <a:t>Virtual</a:t>
-            </a:r>
-            <a:r>
-              <a:rPr lang="sv-SE" sz="1600" dirty="0"/>
-              <a:t> </a:t>
-            </a:r>
-            <a:r>
-              <a:rPr lang="sv-SE" sz="1600" dirty="0" err="1"/>
-              <a:t>Size</a:t>
-            </a:r>
-            <a:r>
-              <a:rPr lang="sv-SE" sz="1600" dirty="0"/>
-              <a:t>: 643.3 MB Tags: ra1f/</a:t>
-            </a:r>
-            <a:r>
-              <a:rPr lang="sv-SE" sz="1600" dirty="0" err="1"/>
-              <a:t>docker_intro_webserver:latest</a:t>
-            </a:r>
-            <a:endParaRPr lang="de-DE" sz="1600" dirty="0"/>
+              <a:rPr lang="de-DE" dirty="0"/>
+              <a:t>FROM </a:t>
+            </a:r>
+            <a:r>
+              <a:rPr lang="de-DE" dirty="0" err="1"/>
+              <a:t>lukaspustina</a:t>
+            </a:r>
+            <a:r>
+              <a:rPr lang="de-DE" dirty="0"/>
+              <a:t>/</a:t>
+            </a:r>
+            <a:r>
+              <a:rPr lang="de-DE" dirty="0" err="1"/>
+              <a:t>docker_demo_python</a:t>
+            </a:r>
+            <a:endParaRPr lang="de-DE" dirty="0"/>
+          </a:p>
+          <a:p>
+            <a:endParaRPr lang="de-DE" dirty="0"/>
+          </a:p>
+          <a:p>
+            <a:r>
+              <a:rPr lang="de-DE" dirty="0"/>
+              <a:t>MAINTAINER Lukas </a:t>
+            </a:r>
+            <a:r>
+              <a:rPr lang="de-DE" dirty="0" err="1"/>
+              <a:t>Pustina</a:t>
+            </a:r>
+            <a:r>
+              <a:rPr lang="de-DE" dirty="0"/>
+              <a:t> &lt;</a:t>
+            </a:r>
+            <a:r>
+              <a:rPr lang="de-DE" dirty="0" err="1"/>
+              <a:t>lukas.pustina@codecentric.de</a:t>
+            </a:r>
+            <a:r>
+              <a:rPr lang="de-DE" dirty="0"/>
+              <a:t>&gt;</a:t>
+            </a:r>
+          </a:p>
+          <a:p>
+            <a:endParaRPr lang="de-DE" dirty="0"/>
+          </a:p>
+          <a:p>
+            <a:r>
+              <a:rPr lang="de-DE" dirty="0"/>
+              <a:t>EXPOSE 8080</a:t>
+            </a:r>
+          </a:p>
+          <a:p>
+            <a:endParaRPr lang="de-DE" dirty="0"/>
+          </a:p>
+          <a:p>
+            <a:r>
+              <a:rPr lang="de-DE" dirty="0"/>
+              <a:t>ADD </a:t>
+            </a:r>
+            <a:r>
+              <a:rPr lang="de-DE" dirty="0" err="1"/>
+              <a:t>webserver.py</a:t>
+            </a:r>
+            <a:r>
+              <a:rPr lang="de-DE" dirty="0"/>
+              <a:t> /</a:t>
+            </a:r>
+            <a:r>
+              <a:rPr lang="de-DE" dirty="0" err="1"/>
+              <a:t>opt</a:t>
+            </a:r>
+            <a:r>
+              <a:rPr lang="de-DE" dirty="0"/>
+              <a:t>/</a:t>
+            </a:r>
+            <a:r>
+              <a:rPr lang="de-DE" dirty="0" err="1"/>
+              <a:t>webserver</a:t>
+            </a:r>
+            <a:r>
+              <a:rPr lang="de-DE" dirty="0"/>
+              <a:t>/</a:t>
+            </a:r>
+            <a:r>
+              <a:rPr lang="de-DE" dirty="0" err="1"/>
+              <a:t>webserver.py</a:t>
+            </a:r>
+            <a:endParaRPr lang="de-DE" dirty="0"/>
+          </a:p>
+          <a:p>
+            <a:r>
+              <a:rPr lang="de-DE" dirty="0"/>
+              <a:t>ADD </a:t>
+            </a:r>
+            <a:r>
+              <a:rPr lang="de-DE" dirty="0" err="1"/>
+              <a:t>run.sh</a:t>
+            </a:r>
+            <a:r>
+              <a:rPr lang="de-DE" dirty="0"/>
+              <a:t> /</a:t>
+            </a:r>
+            <a:r>
+              <a:rPr lang="de-DE" dirty="0" err="1"/>
+              <a:t>opt</a:t>
+            </a:r>
+            <a:r>
+              <a:rPr lang="de-DE" dirty="0"/>
+              <a:t>/</a:t>
+            </a:r>
+            <a:r>
+              <a:rPr lang="de-DE" dirty="0" err="1"/>
+              <a:t>webserver</a:t>
+            </a:r>
+            <a:r>
+              <a:rPr lang="de-DE" dirty="0"/>
+              <a:t>/</a:t>
+            </a:r>
+            <a:r>
+              <a:rPr lang="de-DE" dirty="0" err="1"/>
+              <a:t>run.sh</a:t>
+            </a:r>
+            <a:endParaRPr lang="de-DE" dirty="0"/>
+          </a:p>
+          <a:p>
+            <a:endParaRPr lang="de-DE" dirty="0"/>
+          </a:p>
+          <a:p>
+            <a:r>
+              <a:rPr lang="de-DE" dirty="0"/>
+              <a:t>VOLUME ["/</a:t>
+            </a:r>
+            <a:r>
+              <a:rPr lang="de-DE" dirty="0" err="1"/>
+              <a:t>logs</a:t>
+            </a:r>
+            <a:r>
+              <a:rPr lang="de-DE" dirty="0"/>
+              <a:t>"]</a:t>
+            </a:r>
           </a:p>
         </p:txBody>
       </p:sp>
     </p:spTree>
     <p:extLst>
       <p:ext uri="{BB962C8B-B14F-4D97-AF65-F5344CB8AC3E}">
-        <p14:creationId xmlns:p14="http://schemas.microsoft.com/office/powerpoint/2010/main" val="720670703"/>
+        <p14:creationId xmlns:p14="http://schemas.microsoft.com/office/powerpoint/2010/main" val="2566868290"/>
       </p:ext>
     </p:extLst>
   </p:cSld>
   <p:clrMapOvr>
     <a:masterClrMapping/>
   </p:clrMapOvr>
+  <p:timing>
+    <p:tnLst>
+      <p:par>
+        <p:cTn xmlns:p14="http://schemas.microsoft.com/office/powerpoint/2010/main" id="1" dur="indefinite" restart="never" nodeType="tmRoot"/>
+      </p:par>
+    </p:tnLst>
+  </p:timing>
 </p:sld>
 </file>
 
@@ -6293,8 +7289,8 @@
           <a:lstStyle/>
           <a:p>
             <a:r>
-              <a:rPr lang="de-DE" dirty="0" smtClean="0"/>
-              <a:t>Run</a:t>
+              <a:rPr lang="de-DE" dirty="0" err="1" smtClean="0"/>
+              <a:t>Build</a:t>
             </a:r>
             <a:endParaRPr lang="de-DE" dirty="0"/>
           </a:p>
@@ -6302,14 +7298,14 @@
       </p:sp>
       <p:sp>
         <p:nvSpPr>
-          <p:cNvPr id="5" name="Textfeld 4"/>
+          <p:cNvPr id="4" name="Textfeld 3"/>
           <p:cNvSpPr txBox="1"/>
           <p:nvPr/>
         </p:nvSpPr>
         <p:spPr>
           <a:xfrm>
-            <a:off x="821068" y="3027333"/>
-            <a:ext cx="7934684" cy="923330"/>
+            <a:off x="1402483" y="3151621"/>
+            <a:ext cx="6006773" cy="369332"/>
           </a:xfrm>
           <a:prstGeom prst="rect">
             <a:avLst/>
@@ -6331,138 +7327,435 @@
               <a:t> </a:t>
             </a:r>
             <a:r>
+              <a:rPr lang="de-DE" dirty="0" err="1" smtClean="0"/>
+              <a:t>build</a:t>
+            </a:r>
+            <a:r>
+              <a:rPr lang="de-DE" dirty="0" smtClean="0"/>
+              <a:t> </a:t>
+            </a:r>
+            <a:r>
+              <a:rPr lang="de-DE" dirty="0"/>
+              <a:t>--</a:t>
+            </a:r>
+            <a:r>
               <a:rPr lang="de-DE" dirty="0" err="1"/>
-              <a:t>run</a:t>
+              <a:t>force-rm</a:t>
             </a:r>
             <a:r>
               <a:rPr lang="de-DE" dirty="0"/>
-              <a:t> -d --</a:t>
+              <a:t> –t ra1f/</a:t>
             </a:r>
             <a:r>
               <a:rPr lang="de-DE" dirty="0" err="1"/>
-              <a:t>cidfile</a:t>
+              <a:t>docker_intro_groovy</a:t>
             </a:r>
             <a:r>
               <a:rPr lang="de-DE" dirty="0"/>
-              <a:t>=$&lt;/webserver-$$</a:t>
-            </a:r>
+              <a:t> groovy</a:t>
+            </a:r>
+          </a:p>
+        </p:txBody>
+      </p:sp>
+      <p:sp>
+        <p:nvSpPr>
+          <p:cNvPr id="5" name="Textfeld 4"/>
+          <p:cNvSpPr txBox="1"/>
+          <p:nvPr/>
+        </p:nvSpPr>
+        <p:spPr>
+          <a:xfrm>
+            <a:off x="1402483" y="3738682"/>
+            <a:ext cx="6597029" cy="369332"/>
+          </a:xfrm>
+          <a:prstGeom prst="rect">
+            <a:avLst/>
+          </a:prstGeom>
+          <a:noFill/>
+        </p:spPr>
+        <p:txBody>
+          <a:bodyPr wrap="none" rtlCol="0">
+            <a:spAutoFit/>
+          </a:bodyPr>
+          <a:lstStyle/>
+          <a:p>
             <a:r>
               <a:rPr lang="de-DE" dirty="0" err="1"/>
-              <a:t>i.cid</a:t>
-            </a:r>
-            <a:r>
-              <a:rPr lang="de-DE" dirty="0"/>
-              <a:t> --name=$$</a:t>
-            </a:r>
-            <a:r>
-              <a:rPr lang="de-DE" dirty="0" err="1"/>
-              <a:t>name</a:t>
+              <a:t>docker</a:t>
             </a:r>
             <a:r>
               <a:rPr lang="de-DE" dirty="0"/>
               <a:t> </a:t>
             </a:r>
-            <a:endParaRPr lang="de-DE" dirty="0" smtClean="0"/>
-          </a:p>
-          <a:p>
+            <a:r>
+              <a:rPr lang="de-DE" dirty="0" err="1" smtClean="0"/>
+              <a:t>build</a:t>
+            </a:r>
+            <a:r>
+              <a:rPr lang="de-DE" dirty="0" smtClean="0"/>
+              <a:t> </a:t>
+            </a:r>
+            <a:r>
+              <a:rPr lang="de-DE" dirty="0"/>
+              <a:t>--</a:t>
+            </a:r>
+            <a:r>
+              <a:rPr lang="de-DE" dirty="0" err="1"/>
+              <a:t>force-rm</a:t>
+            </a:r>
+            <a:r>
+              <a:rPr lang="de-DE" dirty="0"/>
+              <a:t> –t ra1f/</a:t>
+            </a:r>
+            <a:r>
+              <a:rPr lang="de-DE" dirty="0" err="1"/>
+              <a:t>docker_intro_webserver</a:t>
+            </a:r>
+            <a:r>
+              <a:rPr lang="de-DE" dirty="0"/>
+              <a:t> webserver</a:t>
+            </a:r>
+          </a:p>
+        </p:txBody>
+      </p:sp>
+      <p:sp>
+        <p:nvSpPr>
+          <p:cNvPr id="6" name="Textfeld 5"/>
+          <p:cNvSpPr txBox="1"/>
+          <p:nvPr/>
+        </p:nvSpPr>
+        <p:spPr>
+          <a:xfrm>
+            <a:off x="1402483" y="4459403"/>
+            <a:ext cx="1579579" cy="369332"/>
+          </a:xfrm>
+          <a:prstGeom prst="rect">
+            <a:avLst/>
+          </a:prstGeom>
+          <a:noFill/>
+        </p:spPr>
+        <p:txBody>
+          <a:bodyPr wrap="none" rtlCol="0">
+            <a:spAutoFit/>
+          </a:bodyPr>
+          <a:lstStyle/>
+          <a:p>
+            <a:r>
+              <a:rPr lang="de-DE" dirty="0" err="1"/>
+              <a:t>docker</a:t>
+            </a:r>
             <a:r>
               <a:rPr lang="de-DE" dirty="0"/>
               <a:t> </a:t>
             </a:r>
             <a:r>
-              <a:rPr lang="de-DE" dirty="0" smtClean="0"/>
-              <a:t>                      -</a:t>
-            </a:r>
-            <a:r>
-              <a:rPr lang="de-DE" dirty="0"/>
-              <a:t>-hostname=$$</a:t>
-            </a:r>
-            <a:r>
               <a:rPr lang="de-DE" dirty="0" err="1"/>
-              <a:t>name</a:t>
-            </a:r>
-            <a:r>
-              <a:rPr lang="de-DE" dirty="0"/>
-              <a:t> -v `</a:t>
-            </a:r>
-            <a:r>
-              <a:rPr lang="de-DE" dirty="0" err="1"/>
-              <a:t>pwd</a:t>
-            </a:r>
-            <a:r>
-              <a:rPr lang="de-DE" dirty="0"/>
-              <a:t>`/$&lt;:/</a:t>
-            </a:r>
-            <a:r>
-              <a:rPr lang="de-DE" dirty="0" err="1"/>
-              <a:t>logs</a:t>
-            </a:r>
-            <a:r>
-              <a:rPr lang="de-DE" dirty="0"/>
-              <a:t> </a:t>
-            </a:r>
-            <a:endParaRPr lang="de-DE" dirty="0" smtClean="0"/>
-          </a:p>
-          <a:p>
-            <a:r>
-              <a:rPr lang="de-DE" dirty="0"/>
-              <a:t> </a:t>
-            </a:r>
-            <a:r>
-              <a:rPr lang="de-DE" dirty="0" smtClean="0"/>
-              <a:t>                     </a:t>
-            </a:r>
-            <a:r>
-              <a:rPr lang="de-DE" dirty="0"/>
-              <a:t> ra1f/</a:t>
-            </a:r>
-            <a:r>
-              <a:rPr lang="de-DE"/>
-              <a:t>docker_intro_webserver:latest</a:t>
-            </a:r>
-            <a:r>
-              <a:rPr lang="de-DE" dirty="0"/>
-              <a:t> /</a:t>
-            </a:r>
-            <a:r>
-              <a:rPr lang="de-DE" dirty="0" err="1"/>
-              <a:t>opt</a:t>
-            </a:r>
-            <a:r>
-              <a:rPr lang="de-DE" dirty="0"/>
-              <a:t>/</a:t>
-            </a:r>
-            <a:r>
-              <a:rPr lang="de-DE" dirty="0" err="1"/>
-              <a:t>webserver</a:t>
-            </a:r>
-            <a:r>
-              <a:rPr lang="de-DE" dirty="0"/>
-              <a:t>/</a:t>
-            </a:r>
-            <a:r>
-              <a:rPr lang="de-DE" dirty="0" err="1"/>
-              <a:t>run.sh</a:t>
-            </a:r>
-            <a:r>
-              <a:rPr lang="de-DE" dirty="0"/>
-              <a:t> /</a:t>
-            </a:r>
-            <a:r>
-              <a:rPr lang="de-DE" dirty="0" err="1"/>
-              <a:t>logs</a:t>
-            </a:r>
-            <a:r>
-              <a:rPr lang="de-DE" dirty="0"/>
-              <a:t>)</a:t>
-            </a:r>
+              <a:t>images</a:t>
+            </a:r>
+            <a:endParaRPr lang="de-DE" dirty="0"/>
           </a:p>
         </p:txBody>
       </p:sp>
     </p:spTree>
     <p:extLst>
       <p:ext uri="{BB962C8B-B14F-4D97-AF65-F5344CB8AC3E}">
-        <p14:creationId xmlns:p14="http://schemas.microsoft.com/office/powerpoint/2010/main" val="4237599935"/>
+        <p14:creationId xmlns:p14="http://schemas.microsoft.com/office/powerpoint/2010/main" val="989218148"/>
+      </p:ext>
+    </p:extLst>
+  </p:cSld>
+  <p:clrMapOvr>
+    <a:masterClrMapping/>
+  </p:clrMapOvr>
+</p:sld>
+</file>
+
+<file path=ppt/slides/slide9.xml><?xml version="1.0" encoding="utf-8"?>
+<p:sld xmlns:a="http://schemas.openxmlformats.org/drawingml/2006/main" xmlns:r="http://schemas.openxmlformats.org/officeDocument/2006/relationships" xmlns:p="http://schemas.openxmlformats.org/presentationml/2006/main">
+  <p:cSld>
+    <p:spTree>
+      <p:nvGrpSpPr>
+        <p:cNvPr id="1" name=""/>
+        <p:cNvGrpSpPr/>
+        <p:nvPr/>
+      </p:nvGrpSpPr>
+      <p:grpSpPr>
+        <a:xfrm>
+          <a:off x="0" y="0"/>
+          <a:ext cx="0" cy="0"/>
+          <a:chOff x="0" y="0"/>
+          <a:chExt cx="0" cy="0"/>
+        </a:xfrm>
+      </p:grpSpPr>
+      <p:sp>
+        <p:nvSpPr>
+          <p:cNvPr id="2" name="Titel 1"/>
+          <p:cNvSpPr>
+            <a:spLocks noGrp="1"/>
+          </p:cNvSpPr>
+          <p:nvPr>
+            <p:ph type="title"/>
+          </p:nvPr>
+        </p:nvSpPr>
+        <p:spPr/>
+        <p:txBody>
+          <a:bodyPr/>
+          <a:lstStyle/>
+          <a:p>
+            <a:endParaRPr lang="de-DE"/>
+          </a:p>
+        </p:txBody>
+      </p:sp>
+      <p:sp>
+        <p:nvSpPr>
+          <p:cNvPr id="4" name="Textfeld 3"/>
+          <p:cNvSpPr txBox="1"/>
+          <p:nvPr/>
+        </p:nvSpPr>
+        <p:spPr>
+          <a:xfrm>
+            <a:off x="181990" y="1676954"/>
+            <a:ext cx="8858280" cy="4031873"/>
+          </a:xfrm>
+          <a:prstGeom prst="rect">
+            <a:avLst/>
+          </a:prstGeom>
+          <a:noFill/>
+        </p:spPr>
+        <p:txBody>
+          <a:bodyPr wrap="square" rtlCol="0">
+            <a:spAutoFit/>
+          </a:bodyPr>
+          <a:lstStyle/>
+          <a:p>
+            <a:r>
+              <a:rPr lang="de-DE" sz="1600" dirty="0" err="1"/>
+              <a:t>vagrant@docker-intro</a:t>
+            </a:r>
+            <a:r>
+              <a:rPr lang="de-DE" sz="1600" dirty="0"/>
+              <a:t>:/</a:t>
+            </a:r>
+            <a:r>
+              <a:rPr lang="de-DE" sz="1600" dirty="0" err="1"/>
+              <a:t>vagrant</a:t>
+            </a:r>
+            <a:r>
+              <a:rPr lang="de-DE" sz="1600" dirty="0"/>
+              <a:t>$ </a:t>
+            </a:r>
+            <a:r>
+              <a:rPr lang="de-DE" sz="1600" dirty="0" err="1"/>
+              <a:t>docker</a:t>
+            </a:r>
+            <a:r>
+              <a:rPr lang="de-DE" sz="1600" dirty="0"/>
+              <a:t> </a:t>
+            </a:r>
+            <a:r>
+              <a:rPr lang="de-DE" sz="1600" dirty="0" err="1"/>
+              <a:t>images</a:t>
+            </a:r>
+            <a:r>
+              <a:rPr lang="de-DE" sz="1600" dirty="0"/>
+              <a:t> </a:t>
+            </a:r>
+            <a:r>
+              <a:rPr lang="de-DE" sz="1600" dirty="0" smtClean="0"/>
+              <a:t>–</a:t>
+            </a:r>
+            <a:r>
+              <a:rPr lang="de-DE" sz="1600" dirty="0" err="1" smtClean="0"/>
+              <a:t>tree</a:t>
+            </a:r>
+            <a:endParaRPr lang="de-DE" sz="1600" dirty="0"/>
+          </a:p>
+          <a:p>
+            <a:r>
+              <a:rPr lang="en-US" sz="1600" dirty="0" smtClean="0"/>
+              <a:t>└</a:t>
+            </a:r>
+            <a:r>
+              <a:rPr lang="en-US" sz="1600" dirty="0"/>
+              <a:t>─511136ea3c5a Virtual Size: 0 B</a:t>
+            </a:r>
+          </a:p>
+          <a:p>
+            <a:r>
+              <a:rPr lang="nl-NL" sz="1600" dirty="0"/>
+              <a:t>  └─fa4fd76b09ce Virtual </a:t>
+            </a:r>
+            <a:r>
+              <a:rPr lang="nl-NL" sz="1600" dirty="0" err="1"/>
+              <a:t>Size</a:t>
+            </a:r>
+            <a:r>
+              <a:rPr lang="nl-NL" sz="1600" dirty="0"/>
+              <a:t>: 188.1 MB</a:t>
+            </a:r>
+          </a:p>
+          <a:p>
+            <a:r>
+              <a:rPr lang="en-US" sz="1600" dirty="0"/>
+              <a:t>    └─1c8294cc5160 Virtual Size: 188.3 MB</a:t>
+            </a:r>
+          </a:p>
+          <a:p>
+            <a:r>
+              <a:rPr lang="fi-FI" sz="1600" dirty="0"/>
+              <a:t>      └─117ee323aaa9 </a:t>
+            </a:r>
+            <a:r>
+              <a:rPr lang="fi-FI" sz="1600" dirty="0" err="1"/>
+              <a:t>Virtual</a:t>
+            </a:r>
+            <a:r>
+              <a:rPr lang="fi-FI" sz="1600" dirty="0"/>
+              <a:t> </a:t>
+            </a:r>
+            <a:r>
+              <a:rPr lang="fi-FI" sz="1600" dirty="0" err="1"/>
+              <a:t>Size</a:t>
+            </a:r>
+            <a:r>
+              <a:rPr lang="fi-FI" sz="1600" dirty="0"/>
+              <a:t>: 188.3 MB</a:t>
+            </a:r>
+          </a:p>
+          <a:p>
+            <a:r>
+              <a:rPr lang="fi-FI" sz="1600" dirty="0"/>
+              <a:t>        └─2d24f826cb16 </a:t>
+            </a:r>
+            <a:r>
+              <a:rPr lang="fi-FI" sz="1600" dirty="0" err="1"/>
+              <a:t>Virtual</a:t>
+            </a:r>
+            <a:r>
+              <a:rPr lang="fi-FI" sz="1600" dirty="0"/>
+              <a:t> </a:t>
+            </a:r>
+            <a:r>
+              <a:rPr lang="fi-FI" sz="1600" dirty="0" err="1"/>
+              <a:t>Size</a:t>
+            </a:r>
+            <a:r>
+              <a:rPr lang="fi-FI" sz="1600" dirty="0"/>
+              <a:t>: 188.3 MB </a:t>
+            </a:r>
+            <a:r>
+              <a:rPr lang="fi-FI" sz="1600" dirty="0" err="1"/>
+              <a:t>Tags</a:t>
+            </a:r>
+            <a:r>
+              <a:rPr lang="fi-FI" sz="1600" dirty="0"/>
+              <a:t>: ubuntu:14.04, ubuntu:14.04.2, </a:t>
+            </a:r>
+            <a:r>
+              <a:rPr lang="fi-FI" sz="1600" dirty="0" err="1"/>
+              <a:t>ubuntu:latest</a:t>
+            </a:r>
+            <a:r>
+              <a:rPr lang="fi-FI" sz="1600" dirty="0"/>
+              <a:t>, </a:t>
+            </a:r>
+            <a:r>
+              <a:rPr lang="fi-FI" sz="1600" dirty="0" err="1"/>
+              <a:t>ubuntu:trusty</a:t>
+            </a:r>
+            <a:r>
+              <a:rPr lang="fi-FI" sz="1600" dirty="0"/>
+              <a:t>, ubuntu:trusty-20150218.1</a:t>
+            </a:r>
+          </a:p>
+          <a:p>
+            <a:r>
+              <a:rPr lang="nl-NL" sz="1600" dirty="0"/>
+              <a:t>          └─fdce9251e6bf Virtual </a:t>
+            </a:r>
+            <a:r>
+              <a:rPr lang="nl-NL" sz="1600" dirty="0" err="1"/>
+              <a:t>Size</a:t>
+            </a:r>
+            <a:r>
+              <a:rPr lang="nl-NL" sz="1600" dirty="0"/>
+              <a:t>: 188.3 MB</a:t>
+            </a:r>
+          </a:p>
+          <a:p>
+            <a:r>
+              <a:rPr lang="en-US" sz="1600" dirty="0"/>
+              <a:t>            └─5e99d9973e1a Virtual Size: 188.3 MB</a:t>
+            </a:r>
+          </a:p>
+          <a:p>
+            <a:r>
+              <a:rPr lang="en-US" sz="1600" dirty="0"/>
+              <a:t>              └─9a60cbf2ae2f Virtual Size: 570.3 MB</a:t>
+            </a:r>
+          </a:p>
+          <a:p>
+            <a:r>
+              <a:rPr lang="en-US" sz="1600" dirty="0"/>
+              <a:t>                └─32000bf385d5 Virtual Size: 572.7 MB</a:t>
+            </a:r>
+          </a:p>
+          <a:p>
+            <a:r>
+              <a:rPr lang="en-US" sz="1600" dirty="0"/>
+              <a:t>                  └─9c97d28b0d55 Virtual Size: 575.8 MB</a:t>
+            </a:r>
+          </a:p>
+          <a:p>
+            <a:r>
+              <a:rPr lang="en-US" sz="1600" dirty="0"/>
+              <a:t>                    └─962dba9dfa39 Virtual Size: 575.8 MB</a:t>
+            </a:r>
+          </a:p>
+          <a:p>
+            <a:r>
+              <a:rPr lang="en-US" sz="1600" dirty="0"/>
+              <a:t>                      └─374ea2adf24e Virtual Size: 575.8 MB</a:t>
+            </a:r>
+          </a:p>
+          <a:p>
+            <a:r>
+              <a:rPr lang="fi-FI" sz="1600" dirty="0"/>
+              <a:t>                        └─c67aa605647c </a:t>
+            </a:r>
+            <a:r>
+              <a:rPr lang="fi-FI" sz="1600" dirty="0" err="1"/>
+              <a:t>Virtual</a:t>
+            </a:r>
+            <a:r>
+              <a:rPr lang="fi-FI" sz="1600" dirty="0"/>
+              <a:t> </a:t>
+            </a:r>
+            <a:r>
+              <a:rPr lang="fi-FI" sz="1600" dirty="0" err="1"/>
+              <a:t>Size</a:t>
+            </a:r>
+            <a:r>
+              <a:rPr lang="fi-FI" sz="1600" dirty="0"/>
+              <a:t>: 575.8 MB</a:t>
+            </a:r>
+          </a:p>
+          <a:p>
+            <a:r>
+              <a:rPr lang="en-US" sz="1600" dirty="0"/>
+              <a:t>                          └─6336aee1007d Virtual Size: 643.3 MB Tags: ra1f/</a:t>
+            </a:r>
+            <a:r>
+              <a:rPr lang="en-US" sz="1600" dirty="0" err="1"/>
+              <a:t>docker_intro_groovy:latest</a:t>
+            </a:r>
+            <a:endParaRPr lang="de-DE" sz="1600" dirty="0"/>
+          </a:p>
+        </p:txBody>
+      </p:sp>
+    </p:spTree>
+    <p:extLst>
+      <p:ext uri="{BB962C8B-B14F-4D97-AF65-F5344CB8AC3E}">
+        <p14:creationId xmlns:p14="http://schemas.microsoft.com/office/powerpoint/2010/main" val="3651636047"/>
       </p:ext>
     </p:extLst>
   </p:cSld>
@@ -6727,4 +8020,324 @@
   </a:objectDefaults>
   <a:extraClrSchemeLst/>
 </a:theme>
+</file>
+
+<file path=ppt/theme/theme2.xml><?xml version="1.0" encoding="utf-8"?>
+<a:theme xmlns:a="http://schemas.openxmlformats.org/drawingml/2006/main" name="Office-Design">
+  <a:themeElements>
+    <a:clrScheme name="Office">
+      <a:dk1>
+        <a:sysClr val="windowText" lastClr="000000"/>
+      </a:dk1>
+      <a:lt1>
+        <a:sysClr val="window" lastClr="FFFFFF"/>
+      </a:lt1>
+      <a:dk2>
+        <a:srgbClr val="1F497D"/>
+      </a:dk2>
+      <a:lt2>
+        <a:srgbClr val="EEECE1"/>
+      </a:lt2>
+      <a:accent1>
+        <a:srgbClr val="4F81BD"/>
+      </a:accent1>
+      <a:accent2>
+        <a:srgbClr val="C0504D"/>
+      </a:accent2>
+      <a:accent3>
+        <a:srgbClr val="9BBB59"/>
+      </a:accent3>
+      <a:accent4>
+        <a:srgbClr val="8064A2"/>
+      </a:accent4>
+      <a:accent5>
+        <a:srgbClr val="4BACC6"/>
+      </a:accent5>
+      <a:accent6>
+        <a:srgbClr val="F79646"/>
+      </a:accent6>
+      <a:hlink>
+        <a:srgbClr val="0000FF"/>
+      </a:hlink>
+      <a:folHlink>
+        <a:srgbClr val="800080"/>
+      </a:folHlink>
+    </a:clrScheme>
+    <a:fontScheme name="Office">
+      <a:majorFont>
+        <a:latin typeface="Calibri"/>
+        <a:ea typeface=""/>
+        <a:cs typeface=""/>
+        <a:font script="Jpan" typeface="ＭＳ Ｐゴシック"/>
+        <a:font script="Hang" typeface="맑은 고딕"/>
+        <a:font script="Hans" typeface="宋体"/>
+        <a:font script="Hant" typeface="新細明體"/>
+        <a:font script="Arab" typeface="Times New Roman"/>
+        <a:font script="Hebr" typeface="Times New Roman"/>
+        <a:font script="Thai" typeface="Angsana New"/>
+        <a:font script="Ethi" typeface="Nyala"/>
+        <a:font script="Beng" typeface="Vrinda"/>
+        <a:font script="Gujr" typeface="Shruti"/>
+        <a:font script="Khmr" typeface="MoolBoran"/>
+        <a:font script="Knda" typeface="Tunga"/>
+        <a:font script="Guru" typeface="Raavi"/>
+        <a:font script="Cans" typeface="Euphemia"/>
+        <a:font script="Cher" typeface="Plantagenet Cherokee"/>
+        <a:font script="Yiii" typeface="Microsoft Yi Baiti"/>
+        <a:font script="Tibt" typeface="Microsoft Himalaya"/>
+        <a:font script="Thaa" typeface="MV Boli"/>
+        <a:font script="Deva" typeface="Mangal"/>
+        <a:font script="Telu" typeface="Gautami"/>
+        <a:font script="Taml" typeface="Latha"/>
+        <a:font script="Syrc" typeface="Estrangelo Edessa"/>
+        <a:font script="Orya" typeface="Kalinga"/>
+        <a:font script="Mlym" typeface="Kartika"/>
+        <a:font script="Laoo" typeface="DokChampa"/>
+        <a:font script="Sinh" typeface="Iskoola Pota"/>
+        <a:font script="Mong" typeface="Mongolian Baiti"/>
+        <a:font script="Viet" typeface="Times New Roman"/>
+        <a:font script="Uigh" typeface="Microsoft Uighur"/>
+        <a:font script="Geor" typeface="Sylfaen"/>
+      </a:majorFont>
+      <a:minorFont>
+        <a:latin typeface="Calibri"/>
+        <a:ea typeface=""/>
+        <a:cs typeface=""/>
+        <a:font script="Jpan" typeface="ＭＳ Ｐゴシック"/>
+        <a:font script="Hang" typeface="맑은 고딕"/>
+        <a:font script="Hans" typeface="宋体"/>
+        <a:font script="Hant" typeface="新細明體"/>
+        <a:font script="Arab" typeface="Arial"/>
+        <a:font script="Hebr" typeface="Arial"/>
+        <a:font script="Thai" typeface="Cordia New"/>
+        <a:font script="Ethi" typeface="Nyala"/>
+        <a:font script="Beng" typeface="Vrinda"/>
+        <a:font script="Gujr" typeface="Shruti"/>
+        <a:font script="Khmr" typeface="DaunPenh"/>
+        <a:font script="Knda" typeface="Tunga"/>
+        <a:font script="Guru" typeface="Raavi"/>
+        <a:font script="Cans" typeface="Euphemia"/>
+        <a:font script="Cher" typeface="Plantagenet Cherokee"/>
+        <a:font script="Yiii" typeface="Microsoft Yi Baiti"/>
+        <a:font script="Tibt" typeface="Microsoft Himalaya"/>
+        <a:font script="Thaa" typeface="MV Boli"/>
+        <a:font script="Deva" typeface="Mangal"/>
+        <a:font script="Telu" typeface="Gautami"/>
+        <a:font script="Taml" typeface="Latha"/>
+        <a:font script="Syrc" typeface="Estrangelo Edessa"/>
+        <a:font script="Orya" typeface="Kalinga"/>
+        <a:font script="Mlym" typeface="Kartika"/>
+        <a:font script="Laoo" typeface="DokChampa"/>
+        <a:font script="Sinh" typeface="Iskoola Pota"/>
+        <a:font script="Mong" typeface="Mongolian Baiti"/>
+        <a:font script="Viet" typeface="Arial"/>
+        <a:font script="Uigh" typeface="Microsoft Uighur"/>
+        <a:font script="Geor" typeface="Sylfaen"/>
+      </a:minorFont>
+    </a:fontScheme>
+    <a:fmtScheme name="Office">
+      <a:fillStyleLst>
+        <a:solidFill>
+          <a:schemeClr val="phClr"/>
+        </a:solidFill>
+        <a:gradFill rotWithShape="1">
+          <a:gsLst>
+            <a:gs pos="0">
+              <a:schemeClr val="phClr">
+                <a:tint val="50000"/>
+                <a:satMod val="300000"/>
+              </a:schemeClr>
+            </a:gs>
+            <a:gs pos="35000">
+              <a:schemeClr val="phClr">
+                <a:tint val="37000"/>
+                <a:satMod val="300000"/>
+              </a:schemeClr>
+            </a:gs>
+            <a:gs pos="100000">
+              <a:schemeClr val="phClr">
+                <a:tint val="15000"/>
+                <a:satMod val="350000"/>
+              </a:schemeClr>
+            </a:gs>
+          </a:gsLst>
+          <a:lin ang="16200000" scaled="1"/>
+        </a:gradFill>
+        <a:gradFill rotWithShape="1">
+          <a:gsLst>
+            <a:gs pos="0">
+              <a:schemeClr val="phClr">
+                <a:tint val="100000"/>
+                <a:shade val="100000"/>
+                <a:satMod val="130000"/>
+              </a:schemeClr>
+            </a:gs>
+            <a:gs pos="100000">
+              <a:schemeClr val="phClr">
+                <a:tint val="50000"/>
+                <a:shade val="100000"/>
+                <a:satMod val="350000"/>
+              </a:schemeClr>
+            </a:gs>
+          </a:gsLst>
+          <a:lin ang="16200000" scaled="0"/>
+        </a:gradFill>
+      </a:fillStyleLst>
+      <a:lnStyleLst>
+        <a:ln w="9525" cap="flat" cmpd="sng" algn="ctr">
+          <a:solidFill>
+            <a:schemeClr val="phClr">
+              <a:shade val="95000"/>
+              <a:satMod val="105000"/>
+            </a:schemeClr>
+          </a:solidFill>
+          <a:prstDash val="solid"/>
+        </a:ln>
+        <a:ln w="25400" cap="flat" cmpd="sng" algn="ctr">
+          <a:solidFill>
+            <a:schemeClr val="phClr"/>
+          </a:solidFill>
+          <a:prstDash val="solid"/>
+        </a:ln>
+        <a:ln w="38100" cap="flat" cmpd="sng" algn="ctr">
+          <a:solidFill>
+            <a:schemeClr val="phClr"/>
+          </a:solidFill>
+          <a:prstDash val="solid"/>
+        </a:ln>
+      </a:lnStyleLst>
+      <a:effectStyleLst>
+        <a:effectStyle>
+          <a:effectLst>
+            <a:outerShdw blurRad="40000" dist="20000" dir="5400000" rotWithShape="0">
+              <a:srgbClr val="000000">
+                <a:alpha val="38000"/>
+              </a:srgbClr>
+            </a:outerShdw>
+          </a:effectLst>
+        </a:effectStyle>
+        <a:effectStyle>
+          <a:effectLst>
+            <a:outerShdw blurRad="40000" dist="23000" dir="5400000" rotWithShape="0">
+              <a:srgbClr val="000000">
+                <a:alpha val="35000"/>
+              </a:srgbClr>
+            </a:outerShdw>
+          </a:effectLst>
+        </a:effectStyle>
+        <a:effectStyle>
+          <a:effectLst>
+            <a:outerShdw blurRad="40000" dist="23000" dir="5400000" rotWithShape="0">
+              <a:srgbClr val="000000">
+                <a:alpha val="35000"/>
+              </a:srgbClr>
+            </a:outerShdw>
+          </a:effectLst>
+          <a:scene3d>
+            <a:camera prst="orthographicFront">
+              <a:rot lat="0" lon="0" rev="0"/>
+            </a:camera>
+            <a:lightRig rig="threePt" dir="t">
+              <a:rot lat="0" lon="0" rev="1200000"/>
+            </a:lightRig>
+          </a:scene3d>
+          <a:sp3d>
+            <a:bevelT w="63500" h="25400"/>
+          </a:sp3d>
+        </a:effectStyle>
+      </a:effectStyleLst>
+      <a:bgFillStyleLst>
+        <a:solidFill>
+          <a:schemeClr val="phClr"/>
+        </a:solidFill>
+        <a:gradFill rotWithShape="1">
+          <a:gsLst>
+            <a:gs pos="0">
+              <a:schemeClr val="phClr">
+                <a:tint val="40000"/>
+                <a:satMod val="350000"/>
+              </a:schemeClr>
+            </a:gs>
+            <a:gs pos="40000">
+              <a:schemeClr val="phClr">
+                <a:tint val="45000"/>
+                <a:shade val="99000"/>
+                <a:satMod val="350000"/>
+              </a:schemeClr>
+            </a:gs>
+            <a:gs pos="100000">
+              <a:schemeClr val="phClr">
+                <a:shade val="20000"/>
+                <a:satMod val="255000"/>
+              </a:schemeClr>
+            </a:gs>
+          </a:gsLst>
+          <a:path path="circle">
+            <a:fillToRect l="50000" t="-80000" r="50000" b="180000"/>
+          </a:path>
+        </a:gradFill>
+        <a:gradFill rotWithShape="1">
+          <a:gsLst>
+            <a:gs pos="0">
+              <a:schemeClr val="phClr">
+                <a:tint val="80000"/>
+                <a:satMod val="300000"/>
+              </a:schemeClr>
+            </a:gs>
+            <a:gs pos="100000">
+              <a:schemeClr val="phClr">
+                <a:shade val="30000"/>
+                <a:satMod val="200000"/>
+              </a:schemeClr>
+            </a:gs>
+          </a:gsLst>
+          <a:path path="circle">
+            <a:fillToRect l="50000" t="50000" r="50000" b="50000"/>
+          </a:path>
+        </a:gradFill>
+      </a:bgFillStyleLst>
+    </a:fmtScheme>
+  </a:themeElements>
+  <a:objectDefaults>
+    <a:spDef>
+      <a:spPr/>
+      <a:bodyPr/>
+      <a:lstStyle/>
+      <a:style>
+        <a:lnRef idx="1">
+          <a:schemeClr val="accent1"/>
+        </a:lnRef>
+        <a:fillRef idx="3">
+          <a:schemeClr val="accent1"/>
+        </a:fillRef>
+        <a:effectRef idx="2">
+          <a:schemeClr val="accent1"/>
+        </a:effectRef>
+        <a:fontRef idx="minor">
+          <a:schemeClr val="lt1"/>
+        </a:fontRef>
+      </a:style>
+    </a:spDef>
+    <a:lnDef>
+      <a:spPr/>
+      <a:bodyPr/>
+      <a:lstStyle/>
+      <a:style>
+        <a:lnRef idx="2">
+          <a:schemeClr val="accent1"/>
+        </a:lnRef>
+        <a:fillRef idx="0">
+          <a:schemeClr val="accent1"/>
+        </a:fillRef>
+        <a:effectRef idx="1">
+          <a:schemeClr val="accent1"/>
+        </a:effectRef>
+        <a:fontRef idx="minor">
+          <a:schemeClr val="tx1"/>
+        </a:fontRef>
+      </a:style>
+    </a:lnDef>
+  </a:objectDefaults>
+  <a:extraClrSchemeLst/>
+</a:theme>
 </file>
</xml_diff>